<commit_message>
took out a few things
</commit_message>
<xml_diff>
--- a/final-presentation/final-presentation-davis-vaughan.pptx
+++ b/final-presentation/final-presentation-davis-vaughan.pptx
@@ -5,10 +5,10 @@
     <p:sldMasterId id="2147483648" r:id="rId1"/>
   </p:sldMasterIdLst>
   <p:notesMasterIdLst>
-    <p:notesMasterId r:id="rId25"/>
+    <p:notesMasterId r:id="rId24"/>
   </p:notesMasterIdLst>
   <p:handoutMasterIdLst>
-    <p:handoutMasterId r:id="rId26"/>
+    <p:handoutMasterId r:id="rId25"/>
   </p:handoutMasterIdLst>
   <p:sldIdLst>
     <p:sldId id="256" r:id="rId2"/>
@@ -20,37 +20,36 @@
     <p:sldId id="261" r:id="rId8"/>
     <p:sldId id="262" r:id="rId9"/>
     <p:sldId id="263" r:id="rId10"/>
-    <p:sldId id="264" r:id="rId11"/>
-    <p:sldId id="265" r:id="rId12"/>
-    <p:sldId id="286" r:id="rId13"/>
-    <p:sldId id="266" r:id="rId14"/>
-    <p:sldId id="274" r:id="rId15"/>
-    <p:sldId id="285" r:id="rId16"/>
-    <p:sldId id="276" r:id="rId17"/>
-    <p:sldId id="280" r:id="rId18"/>
-    <p:sldId id="279" r:id="rId19"/>
-    <p:sldId id="281" r:id="rId20"/>
-    <p:sldId id="282" r:id="rId21"/>
-    <p:sldId id="283" r:id="rId22"/>
-    <p:sldId id="273" r:id="rId23"/>
-    <p:sldId id="284" r:id="rId24"/>
+    <p:sldId id="265" r:id="rId11"/>
+    <p:sldId id="286" r:id="rId12"/>
+    <p:sldId id="266" r:id="rId13"/>
+    <p:sldId id="274" r:id="rId14"/>
+    <p:sldId id="285" r:id="rId15"/>
+    <p:sldId id="276" r:id="rId16"/>
+    <p:sldId id="280" r:id="rId17"/>
+    <p:sldId id="279" r:id="rId18"/>
+    <p:sldId id="281" r:id="rId19"/>
+    <p:sldId id="282" r:id="rId20"/>
+    <p:sldId id="283" r:id="rId21"/>
+    <p:sldId id="273" r:id="rId22"/>
+    <p:sldId id="284" r:id="rId23"/>
   </p:sldIdLst>
   <p:sldSz cx="9144000" cy="6858000" type="screen4x3"/>
   <p:notesSz cx="6858000" cy="9144000"/>
   <p:embeddedFontLst>
     <p:embeddedFont>
       <p:font typeface="Aparajita" panose="020B0604020202020204" pitchFamily="34" charset="0"/>
-      <p:regular r:id="rId27"/>
-      <p:bold r:id="rId28"/>
-      <p:italic r:id="rId29"/>
-      <p:boldItalic r:id="rId30"/>
+      <p:regular r:id="rId26"/>
+      <p:bold r:id="rId27"/>
+      <p:italic r:id="rId28"/>
+      <p:boldItalic r:id="rId29"/>
     </p:embeddedFont>
     <p:embeddedFont>
       <p:font typeface="Calibri" panose="020F0502020204030204" pitchFamily="34" charset="0"/>
-      <p:regular r:id="rId31"/>
-      <p:bold r:id="rId32"/>
-      <p:italic r:id="rId33"/>
-      <p:boldItalic r:id="rId34"/>
+      <p:regular r:id="rId30"/>
+      <p:bold r:id="rId31"/>
+      <p:italic r:id="rId32"/>
+      <p:boldItalic r:id="rId33"/>
     </p:embeddedFont>
   </p:embeddedFontLst>
   <p:defaultTextStyle>
@@ -7289,7 +7288,7 @@
             </a:pPr>
             <a:r>
               <a:rPr lang="en-US" dirty="0" smtClean="0"/>
-              <a:t>Instantly get results that look like this:</a:t>
+              <a:t>With a little more effort…</a:t>
             </a:r>
           </a:p>
           <a:p>
@@ -7348,7 +7347,7 @@
       </p:sp>
       <p:pic>
         <p:nvPicPr>
-          <p:cNvPr id="5" name="Picture 4"/>
+          <p:cNvPr id="6" name="Picture 5"/>
           <p:cNvPicPr>
             <a:picLocks noChangeAspect="1"/>
           </p:cNvPicPr>
@@ -7368,8 +7367,8 @@
         </p:blipFill>
         <p:spPr>
           <a:xfrm>
-            <a:off x="838200" y="2514600"/>
-            <a:ext cx="7086600" cy="3221182"/>
+            <a:off x="838200" y="2500745"/>
+            <a:ext cx="7239000" cy="3290455"/>
           </a:xfrm>
           <a:prstGeom prst="rect">
             <a:avLst/>
@@ -7379,7 +7378,7 @@
     </p:spTree>
     <p:extLst>
       <p:ext uri="{BB962C8B-B14F-4D97-AF65-F5344CB8AC3E}">
-        <p14:creationId xmlns:p14="http://schemas.microsoft.com/office/powerpoint/2010/main" val="2283176206"/>
+        <p14:creationId xmlns:p14="http://schemas.microsoft.com/office/powerpoint/2010/main" val="4065466066"/>
       </p:ext>
     </p:extLst>
   </p:cSld>
@@ -7433,13 +7432,109 @@
             </a:pPr>
             <a:r>
               <a:rPr lang="en-US" i="1" dirty="0" smtClean="0"/>
-              <a:t>Waterfall graphs – Let R do the work for you</a:t>
-            </a:r>
-          </a:p>
-          <a:p>
-            <a:pPr marL="228600" lvl="1" indent="0">
+              <a:t>IRR calculations</a:t>
+            </a:r>
+          </a:p>
+          <a:p>
+            <a:pPr marL="0" indent="0">
               <a:buNone/>
             </a:pPr>
+            <a:endParaRPr lang="en-US" i="1" dirty="0"/>
+          </a:p>
+          <a:p>
+            <a:pPr>
+              <a:spcAft>
+                <a:spcPts val="0"/>
+              </a:spcAft>
+              <a:buFont typeface="Wingdings" panose="05000000000000000000" pitchFamily="2" charset="2"/>
+              <a:buChar char="§"/>
+            </a:pPr>
+            <a:r>
+              <a:rPr lang="en-US" i="1" dirty="0" smtClean="0"/>
+              <a:t>Project:</a:t>
+            </a:r>
+          </a:p>
+          <a:p>
+            <a:pPr lvl="1">
+              <a:spcAft>
+                <a:spcPts val="0"/>
+              </a:spcAft>
+              <a:buFont typeface="Wingdings" panose="05000000000000000000" pitchFamily="2" charset="2"/>
+              <a:buChar char="§"/>
+            </a:pPr>
+            <a:endParaRPr lang="en-US" i="1" dirty="0" smtClean="0"/>
+          </a:p>
+          <a:p>
+            <a:pPr lvl="1">
+              <a:buFont typeface="Wingdings" panose="05000000000000000000" pitchFamily="2" charset="2"/>
+              <a:buChar char="§"/>
+            </a:pPr>
+            <a:r>
+              <a:rPr lang="en-US" dirty="0" smtClean="0"/>
+              <a:t>Calculate IRR for 2400 potential economic scenarios </a:t>
+            </a:r>
+          </a:p>
+          <a:p>
+            <a:pPr lvl="3">
+              <a:buFont typeface="Wingdings" panose="05000000000000000000" pitchFamily="2" charset="2"/>
+              <a:buChar char="§"/>
+            </a:pPr>
+            <a:r>
+              <a:rPr lang="en-US" dirty="0" smtClean="0"/>
+              <a:t>12 Lincoln products, 200 scenarios each</a:t>
+            </a:r>
+          </a:p>
+          <a:p>
+            <a:pPr lvl="3">
+              <a:buFont typeface="Wingdings" panose="05000000000000000000" pitchFamily="2" charset="2"/>
+              <a:buChar char="§"/>
+            </a:pPr>
+            <a:r>
+              <a:rPr lang="en-US" dirty="0" smtClean="0"/>
+              <a:t>40 years of predicted distributable earnings per scenario (cash flows)</a:t>
+            </a:r>
+          </a:p>
+          <a:p>
+            <a:pPr lvl="3">
+              <a:spcAft>
+                <a:spcPts val="0"/>
+              </a:spcAft>
+              <a:buFont typeface="Wingdings" panose="05000000000000000000" pitchFamily="2" charset="2"/>
+              <a:buChar char="§"/>
+            </a:pPr>
+            <a:r>
+              <a:rPr lang="en-US" dirty="0" smtClean="0"/>
+              <a:t>1 GAAP Equity value per product (initial investment)</a:t>
+            </a:r>
+          </a:p>
+          <a:p>
+            <a:pPr lvl="1">
+              <a:spcAft>
+                <a:spcPts val="0"/>
+              </a:spcAft>
+              <a:buFont typeface="Wingdings" panose="05000000000000000000" pitchFamily="2" charset="2"/>
+              <a:buChar char="§"/>
+            </a:pPr>
+            <a:endParaRPr lang="en-US" dirty="0" smtClean="0"/>
+          </a:p>
+          <a:p>
+            <a:pPr lvl="1">
+              <a:spcAft>
+                <a:spcPts val="0"/>
+              </a:spcAft>
+              <a:buFont typeface="Wingdings" panose="05000000000000000000" pitchFamily="2" charset="2"/>
+              <a:buChar char="§"/>
+            </a:pPr>
+            <a:r>
+              <a:rPr lang="en-US" dirty="0" smtClean="0"/>
+              <a:t>Calculation has too many conditions for Excel’s IRR function. Goal Seek needed.</a:t>
+            </a:r>
+          </a:p>
+          <a:p>
+            <a:pPr lvl="1">
+              <a:buFont typeface="Wingdings" panose="05000000000000000000" pitchFamily="2" charset="2"/>
+              <a:buChar char="§"/>
+            </a:pPr>
             <a:endParaRPr lang="en-US" dirty="0"/>
           </a:p>
           <a:p>
@@ -7447,16 +7542,21 @@
               <a:buFont typeface="Wingdings" panose="05000000000000000000" pitchFamily="2" charset="2"/>
               <a:buChar char="§"/>
             </a:pPr>
-            <a:r>
-              <a:rPr lang="en-US" dirty="0" smtClean="0"/>
-              <a:t>With a little more effort…</a:t>
-            </a:r>
-          </a:p>
-          <a:p>
-            <a:pPr marL="228600" lvl="1" indent="0">
-              <a:buNone/>
-            </a:pPr>
-            <a:endParaRPr lang="en-US" dirty="0"/>
+            <a:endParaRPr lang="en-US" i="1" dirty="0" smtClean="0"/>
+          </a:p>
+          <a:p>
+            <a:pPr lvl="1">
+              <a:buFont typeface="Wingdings" panose="05000000000000000000" pitchFamily="2" charset="2"/>
+              <a:buChar char="§"/>
+            </a:pPr>
+            <a:endParaRPr lang="en-US" i="1" dirty="0"/>
+          </a:p>
+          <a:p>
+            <a:pPr lvl="1">
+              <a:buFont typeface="Wingdings" panose="05000000000000000000" pitchFamily="2" charset="2"/>
+              <a:buChar char="§"/>
+            </a:pPr>
+            <a:endParaRPr lang="en-US" dirty="0" smtClean="0"/>
           </a:p>
         </p:txBody>
       </p:sp>
@@ -7500,46 +7600,16 @@
           <a:p>
             <a:r>
               <a:rPr lang="en-US" dirty="0" smtClean="0"/>
-              <a:t>Visualizations</a:t>
+              <a:t>speed</a:t>
             </a:r>
             <a:endParaRPr lang="en-US" dirty="0"/>
           </a:p>
         </p:txBody>
       </p:sp>
-      <p:pic>
-        <p:nvPicPr>
-          <p:cNvPr id="6" name="Picture 5"/>
-          <p:cNvPicPr>
-            <a:picLocks noChangeAspect="1"/>
-          </p:cNvPicPr>
-          <p:nvPr/>
-        </p:nvPicPr>
-        <p:blipFill>
-          <a:blip r:embed="rId2" cstate="print">
-            <a:extLst>
-              <a:ext uri="{28A0092B-C50C-407E-A947-70E740481C1C}">
-                <a14:useLocalDpi xmlns:a14="http://schemas.microsoft.com/office/drawing/2010/main" val="0"/>
-              </a:ext>
-            </a:extLst>
-          </a:blip>
-          <a:stretch>
-            <a:fillRect/>
-          </a:stretch>
-        </p:blipFill>
-        <p:spPr>
-          <a:xfrm>
-            <a:off x="838200" y="2500745"/>
-            <a:ext cx="7239000" cy="3290455"/>
-          </a:xfrm>
-          <a:prstGeom prst="rect">
-            <a:avLst/>
-          </a:prstGeom>
-        </p:spPr>
-      </p:pic>
     </p:spTree>
     <p:extLst>
       <p:ext uri="{BB962C8B-B14F-4D97-AF65-F5344CB8AC3E}">
-        <p14:creationId xmlns:p14="http://schemas.microsoft.com/office/powerpoint/2010/main" val="4065466066"/>
+        <p14:creationId xmlns:p14="http://schemas.microsoft.com/office/powerpoint/2010/main" val="3019645721"/>
       </p:ext>
     </p:extLst>
   </p:cSld>
@@ -7703,6 +7773,38 @@
               <a:buFont typeface="Wingdings" panose="05000000000000000000" pitchFamily="2" charset="2"/>
               <a:buChar char="§"/>
             </a:pPr>
+            <a:r>
+              <a:rPr lang="en-US" b="1" dirty="0" smtClean="0"/>
+              <a:t>3 hours </a:t>
+            </a:r>
+            <a:r>
+              <a:rPr lang="en-US" dirty="0" smtClean="0"/>
+              <a:t>to run all 2400 scenarios</a:t>
+            </a:r>
+          </a:p>
+          <a:p>
+            <a:pPr lvl="1">
+              <a:buFont typeface="Wingdings" panose="05000000000000000000" pitchFamily="2" charset="2"/>
+              <a:buChar char="§"/>
+            </a:pPr>
+            <a:endParaRPr lang="en-US" dirty="0"/>
+          </a:p>
+          <a:p>
+            <a:pPr lvl="1">
+              <a:buFont typeface="Wingdings" panose="05000000000000000000" pitchFamily="2" charset="2"/>
+              <a:buChar char="§"/>
+            </a:pPr>
+            <a:r>
+              <a:rPr lang="en-US" dirty="0" smtClean="0"/>
+              <a:t>Can R do this faster?</a:t>
+            </a:r>
+            <a:endParaRPr lang="en-US" dirty="0"/>
+          </a:p>
+          <a:p>
+            <a:pPr lvl="1">
+              <a:buFont typeface="Wingdings" panose="05000000000000000000" pitchFamily="2" charset="2"/>
+              <a:buChar char="§"/>
+            </a:pPr>
             <a:endParaRPr lang="en-US" i="1" dirty="0" smtClean="0"/>
           </a:p>
           <a:p>
@@ -7770,7 +7872,7 @@
     </p:spTree>
     <p:extLst>
       <p:ext uri="{BB962C8B-B14F-4D97-AF65-F5344CB8AC3E}">
-        <p14:creationId xmlns:p14="http://schemas.microsoft.com/office/powerpoint/2010/main" val="3019645721"/>
+        <p14:creationId xmlns:p14="http://schemas.microsoft.com/office/powerpoint/2010/main" val="1870389015"/>
       </p:ext>
     </p:extLst>
   </p:cSld>
@@ -7843,16 +7945,15 @@
             </a:pPr>
             <a:r>
               <a:rPr lang="en-US" i="1" dirty="0" smtClean="0"/>
-              <a:t>Project:</a:t>
-            </a:r>
-          </a:p>
-          <a:p>
-            <a:pPr lvl="1">
+              <a:t>Solution:</a:t>
+            </a:r>
+          </a:p>
+          <a:p>
+            <a:pPr marL="228600" lvl="1" indent="0">
               <a:spcAft>
                 <a:spcPts val="0"/>
               </a:spcAft>
-              <a:buFont typeface="Wingdings" panose="05000000000000000000" pitchFamily="2" charset="2"/>
-              <a:buChar char="§"/>
+              <a:buNone/>
             </a:pPr>
             <a:endParaRPr lang="en-US" i="1" dirty="0" smtClean="0"/>
           </a:p>
@@ -7863,7 +7964,7 @@
             </a:pPr>
             <a:r>
               <a:rPr lang="en-US" dirty="0" smtClean="0"/>
-              <a:t>Calculate IRR for 2400 potential economic scenarios </a:t>
+              <a:t>Optimization problem – For each of the 2400 scenarios, minimize:</a:t>
             </a:r>
           </a:p>
           <a:p>
@@ -7872,18 +7973,36 @@
               <a:buChar char="§"/>
             </a:pPr>
             <a:r>
-              <a:rPr lang="en-US" dirty="0" smtClean="0"/>
-              <a:t>12 Lincoln products, 200 scenarios each</a:t>
-            </a:r>
+              <a:rPr lang="en-US" sz="2000" dirty="0" smtClean="0">
+                <a:latin typeface="Aparajita" panose="020B0604020202020204" pitchFamily="34" charset="0"/>
+                <a:cs typeface="Aparajita" panose="020B0604020202020204" pitchFamily="34" charset="0"/>
+              </a:rPr>
+              <a:t>PV(distributable earnings) – </a:t>
+            </a:r>
+            <a:r>
+              <a:rPr lang="en-US" sz="2000" dirty="0" err="1" smtClean="0">
+                <a:latin typeface="Aparajita" panose="020B0604020202020204" pitchFamily="34" charset="0"/>
+                <a:cs typeface="Aparajita" panose="020B0604020202020204" pitchFamily="34" charset="0"/>
+              </a:rPr>
+              <a:t>GAAP_equity</a:t>
+            </a:r>
+            <a:r>
+              <a:rPr lang="en-US" i="1" dirty="0"/>
+              <a:t>	</a:t>
+            </a:r>
+            <a:endParaRPr lang="en-US" i="1" dirty="0" smtClean="0"/>
           </a:p>
           <a:p>
             <a:pPr lvl="3">
-              <a:buFont typeface="Wingdings" panose="05000000000000000000" pitchFamily="2" charset="2"/>
-              <a:buChar char="§"/>
-            </a:pPr>
-            <a:r>
-              <a:rPr lang="en-US" dirty="0" smtClean="0"/>
-              <a:t>40 years of predicted distributable earnings per scenario (cash flows)</a:t>
+              <a:spcAft>
+                <a:spcPts val="1200"/>
+              </a:spcAft>
+              <a:buFont typeface="Wingdings" panose="05000000000000000000" pitchFamily="2" charset="2"/>
+              <a:buChar char="§"/>
+            </a:pPr>
+            <a:r>
+              <a:rPr lang="en-US" dirty="0" smtClean="0"/>
+              <a:t>By varying the IRR to discount with</a:t>
             </a:r>
           </a:p>
           <a:p>
@@ -7896,91 +8015,25 @@
             </a:pPr>
             <a:r>
               <a:rPr lang="en-US" dirty="0" smtClean="0"/>
-              <a:t>1 GAAP Equity value per product (initial investment)</a:t>
-            </a:r>
-          </a:p>
-          <a:p>
-            <a:pPr lvl="1">
+              <a:t>Use the R function, </a:t>
+            </a:r>
+            <a:r>
+              <a:rPr lang="en-US" sz="2000" dirty="0" smtClean="0">
+                <a:latin typeface="Aparajita" panose="020B0604020202020204" pitchFamily="34" charset="0"/>
+                <a:cs typeface="Aparajita" panose="020B0604020202020204" pitchFamily="34" charset="0"/>
+              </a:rPr>
+              <a:t> optimize()</a:t>
+            </a:r>
+            <a:endParaRPr lang="en-US" dirty="0"/>
+          </a:p>
+          <a:p>
+            <a:pPr marL="228600" lvl="1" indent="0">
               <a:spcAft>
                 <a:spcPts val="0"/>
               </a:spcAft>
-              <a:buFont typeface="Wingdings" panose="05000000000000000000" pitchFamily="2" charset="2"/>
-              <a:buChar char="§"/>
-            </a:pPr>
-            <a:endParaRPr lang="en-US" dirty="0" smtClean="0"/>
-          </a:p>
-          <a:p>
-            <a:pPr lvl="1">
-              <a:spcAft>
-                <a:spcPts val="0"/>
-              </a:spcAft>
-              <a:buFont typeface="Wingdings" panose="05000000000000000000" pitchFamily="2" charset="2"/>
-              <a:buChar char="§"/>
-            </a:pPr>
-            <a:r>
-              <a:rPr lang="en-US" dirty="0" smtClean="0"/>
-              <a:t>Calculation has too many conditions for Excel’s IRR function. Goal Seek needed.</a:t>
-            </a:r>
-          </a:p>
-          <a:p>
-            <a:pPr lvl="1">
-              <a:buFont typeface="Wingdings" panose="05000000000000000000" pitchFamily="2" charset="2"/>
-              <a:buChar char="§"/>
-            </a:pPr>
-            <a:endParaRPr lang="en-US" dirty="0"/>
-          </a:p>
-          <a:p>
-            <a:pPr lvl="1">
-              <a:buFont typeface="Wingdings" panose="05000000000000000000" pitchFamily="2" charset="2"/>
-              <a:buChar char="§"/>
-            </a:pPr>
-            <a:r>
-              <a:rPr lang="en-US" b="1" dirty="0" smtClean="0"/>
-              <a:t>3 hours </a:t>
-            </a:r>
-            <a:r>
-              <a:rPr lang="en-US" dirty="0" smtClean="0"/>
-              <a:t>to run all 2400 scenarios</a:t>
-            </a:r>
-          </a:p>
-          <a:p>
-            <a:pPr lvl="1">
-              <a:buFont typeface="Wingdings" panose="05000000000000000000" pitchFamily="2" charset="2"/>
-              <a:buChar char="§"/>
-            </a:pPr>
-            <a:endParaRPr lang="en-US" dirty="0"/>
-          </a:p>
-          <a:p>
-            <a:pPr lvl="1">
-              <a:buFont typeface="Wingdings" panose="05000000000000000000" pitchFamily="2" charset="2"/>
-              <a:buChar char="§"/>
-            </a:pPr>
-            <a:r>
-              <a:rPr lang="en-US" dirty="0" smtClean="0"/>
-              <a:t>Can R do this faster?</a:t>
-            </a:r>
-            <a:endParaRPr lang="en-US" dirty="0"/>
-          </a:p>
-          <a:p>
-            <a:pPr lvl="1">
-              <a:buFont typeface="Wingdings" panose="05000000000000000000" pitchFamily="2" charset="2"/>
-              <a:buChar char="§"/>
+              <a:buNone/>
             </a:pPr>
             <a:endParaRPr lang="en-US" i="1" dirty="0" smtClean="0"/>
-          </a:p>
-          <a:p>
-            <a:pPr lvl="1">
-              <a:buFont typeface="Wingdings" panose="05000000000000000000" pitchFamily="2" charset="2"/>
-              <a:buChar char="§"/>
-            </a:pPr>
-            <a:endParaRPr lang="en-US" i="1" dirty="0"/>
-          </a:p>
-          <a:p>
-            <a:pPr lvl="1">
-              <a:buFont typeface="Wingdings" panose="05000000000000000000" pitchFamily="2" charset="2"/>
-              <a:buChar char="§"/>
-            </a:pPr>
-            <a:endParaRPr lang="en-US" dirty="0" smtClean="0"/>
           </a:p>
         </p:txBody>
       </p:sp>
@@ -8033,7 +8086,7 @@
     </p:spTree>
     <p:extLst>
       <p:ext uri="{BB962C8B-B14F-4D97-AF65-F5344CB8AC3E}">
-        <p14:creationId xmlns:p14="http://schemas.microsoft.com/office/powerpoint/2010/main" val="1870389015"/>
+        <p14:creationId xmlns:p14="http://schemas.microsoft.com/office/powerpoint/2010/main" val="3908515491"/>
       </p:ext>
     </p:extLst>
   </p:cSld>
@@ -8196,6 +8249,91 @@
             </a:pPr>
             <a:endParaRPr lang="en-US" i="1" dirty="0" smtClean="0"/>
           </a:p>
+          <a:p>
+            <a:pPr lvl="1">
+              <a:spcAft>
+                <a:spcPts val="0"/>
+              </a:spcAft>
+              <a:buFont typeface="Wingdings" panose="05000000000000000000" pitchFamily="2" charset="2"/>
+              <a:buChar char="§"/>
+            </a:pPr>
+            <a:r>
+              <a:rPr lang="en-US" dirty="0" smtClean="0"/>
+              <a:t>3 hours  -&gt;  </a:t>
+            </a:r>
+            <a:r>
+              <a:rPr lang="en-US" b="1" dirty="0" smtClean="0"/>
+              <a:t>9 seconds in R</a:t>
+            </a:r>
+          </a:p>
+          <a:p>
+            <a:pPr lvl="1">
+              <a:spcAft>
+                <a:spcPts val="0"/>
+              </a:spcAft>
+              <a:buFont typeface="Wingdings" panose="05000000000000000000" pitchFamily="2" charset="2"/>
+              <a:buChar char="§"/>
+            </a:pPr>
+            <a:endParaRPr lang="en-US" dirty="0" smtClean="0"/>
+          </a:p>
+          <a:p>
+            <a:pPr lvl="1">
+              <a:spcAft>
+                <a:spcPts val="0"/>
+              </a:spcAft>
+              <a:buFont typeface="Wingdings" panose="05000000000000000000" pitchFamily="2" charset="2"/>
+              <a:buChar char="§"/>
+            </a:pPr>
+            <a:r>
+              <a:rPr lang="en-US" dirty="0" smtClean="0"/>
+              <a:t>Calculations are </a:t>
+            </a:r>
+            <a:r>
+              <a:rPr lang="en-US" i="1" dirty="0" err="1" smtClean="0"/>
+              <a:t>vectorized</a:t>
+            </a:r>
+            <a:r>
+              <a:rPr lang="en-US" i="1" dirty="0" smtClean="0"/>
+              <a:t> </a:t>
+            </a:r>
+            <a:r>
+              <a:rPr lang="en-US" dirty="0" smtClean="0"/>
+              <a:t>and run </a:t>
+            </a:r>
+            <a:r>
+              <a:rPr lang="en-US" i="1" dirty="0" smtClean="0"/>
+              <a:t>in parallel</a:t>
+            </a:r>
+          </a:p>
+          <a:p>
+            <a:pPr lvl="1">
+              <a:spcAft>
+                <a:spcPts val="0"/>
+              </a:spcAft>
+              <a:buFont typeface="Wingdings" panose="05000000000000000000" pitchFamily="2" charset="2"/>
+              <a:buChar char="§"/>
+            </a:pPr>
+            <a:endParaRPr lang="en-US" i="1" dirty="0"/>
+          </a:p>
+          <a:p>
+            <a:pPr lvl="1">
+              <a:spcAft>
+                <a:spcPts val="0"/>
+              </a:spcAft>
+              <a:buFont typeface="Wingdings" panose="05000000000000000000" pitchFamily="2" charset="2"/>
+              <a:buChar char="§"/>
+            </a:pPr>
+            <a:r>
+              <a:rPr lang="en-US" dirty="0" smtClean="0">
+                <a:hlinkClick r:id="rId2"/>
+              </a:rPr>
+              <a:t>Report</a:t>
+            </a:r>
+            <a:r>
+              <a:rPr lang="en-US" dirty="0" smtClean="0"/>
+              <a:t> generated at the end of each run</a:t>
+            </a:r>
+          </a:p>
         </p:txBody>
       </p:sp>
       <p:sp>
@@ -8247,7 +8385,7 @@
     </p:spTree>
     <p:extLst>
       <p:ext uri="{BB962C8B-B14F-4D97-AF65-F5344CB8AC3E}">
-        <p14:creationId xmlns:p14="http://schemas.microsoft.com/office/powerpoint/2010/main" val="3908515491"/>
+        <p14:creationId xmlns:p14="http://schemas.microsoft.com/office/powerpoint/2010/main" val="3233308965"/>
       </p:ext>
     </p:extLst>
   </p:cSld>
@@ -8301,7 +8439,7 @@
             </a:pPr>
             <a:r>
               <a:rPr lang="en-US" i="1" dirty="0" smtClean="0"/>
-              <a:t>IRR calculations</a:t>
+              <a:t>Input efficiency</a:t>
             </a:r>
           </a:p>
           <a:p>
@@ -8320,7 +8458,7 @@
             </a:pPr>
             <a:r>
               <a:rPr lang="en-US" i="1" dirty="0" smtClean="0"/>
-              <a:t>Solution:</a:t>
+              <a:t>Project:</a:t>
             </a:r>
           </a:p>
           <a:p>
@@ -8334,54 +8472,6 @@
           </a:p>
           <a:p>
             <a:pPr lvl="1">
-              <a:buFont typeface="Wingdings" panose="05000000000000000000" pitchFamily="2" charset="2"/>
-              <a:buChar char="§"/>
-            </a:pPr>
-            <a:r>
-              <a:rPr lang="en-US" dirty="0" smtClean="0"/>
-              <a:t>Optimization problem – For each of the 2400 scenarios, minimize:</a:t>
-            </a:r>
-          </a:p>
-          <a:p>
-            <a:pPr lvl="3">
-              <a:buFont typeface="Wingdings" panose="05000000000000000000" pitchFamily="2" charset="2"/>
-              <a:buChar char="§"/>
-            </a:pPr>
-            <a:r>
-              <a:rPr lang="en-US" sz="2000" dirty="0" smtClean="0">
-                <a:latin typeface="Aparajita" panose="020B0604020202020204" pitchFamily="34" charset="0"/>
-                <a:cs typeface="Aparajita" panose="020B0604020202020204" pitchFamily="34" charset="0"/>
-              </a:rPr>
-              <a:t>PV(distributable earnings) – </a:t>
-            </a:r>
-            <a:r>
-              <a:rPr lang="en-US" sz="2000" dirty="0" err="1" smtClean="0">
-                <a:latin typeface="Aparajita" panose="020B0604020202020204" pitchFamily="34" charset="0"/>
-                <a:cs typeface="Aparajita" panose="020B0604020202020204" pitchFamily="34" charset="0"/>
-              </a:rPr>
-              <a:t>GAAP_equity</a:t>
-            </a:r>
-            <a:r>
-              <a:rPr lang="en-US" i="1" dirty="0"/>
-              <a:t>	</a:t>
-            </a:r>
-            <a:endParaRPr lang="en-US" i="1" dirty="0" smtClean="0"/>
-          </a:p>
-          <a:p>
-            <a:pPr lvl="3">
-              <a:spcAft>
-                <a:spcPts val="1200"/>
-              </a:spcAft>
-              <a:buFont typeface="Wingdings" panose="05000000000000000000" pitchFamily="2" charset="2"/>
-              <a:buChar char="§"/>
-            </a:pPr>
-            <a:r>
-              <a:rPr lang="en-US" dirty="0" smtClean="0"/>
-              <a:t>By varying the IRR to discount with</a:t>
-            </a:r>
-          </a:p>
-          <a:p>
-            <a:pPr lvl="3">
               <a:spcAft>
                 <a:spcPts val="0"/>
               </a:spcAft>
@@ -8389,26 +8479,69 @@
               <a:buChar char="§"/>
             </a:pPr>
             <a:r>
-              <a:rPr lang="en-US" dirty="0" smtClean="0"/>
-              <a:t>Use the R function, </a:t>
-            </a:r>
-            <a:r>
-              <a:rPr lang="en-US" sz="2000" dirty="0" smtClean="0">
-                <a:latin typeface="Aparajita" panose="020B0604020202020204" pitchFamily="34" charset="0"/>
-                <a:cs typeface="Aparajita" panose="020B0604020202020204" pitchFamily="34" charset="0"/>
-              </a:rPr>
-              <a:t> optimize()</a:t>
-            </a:r>
+              <a:rPr lang="en-US" i="1" dirty="0" smtClean="0"/>
+              <a:t>Efficiency – </a:t>
+            </a:r>
+            <a:r>
+              <a:rPr lang="en-US" dirty="0" smtClean="0"/>
+              <a:t>Each line of business has 1 atb2 file containing model assumptions</a:t>
+            </a:r>
+          </a:p>
+          <a:p>
+            <a:pPr lvl="1">
+              <a:spcAft>
+                <a:spcPts val="0"/>
+              </a:spcAft>
+              <a:buFont typeface="Wingdings" panose="05000000000000000000" pitchFamily="2" charset="2"/>
+              <a:buChar char="§"/>
+            </a:pPr>
             <a:endParaRPr lang="en-US" dirty="0"/>
           </a:p>
           <a:p>
-            <a:pPr marL="228600" lvl="1" indent="0">
+            <a:pPr lvl="2">
+              <a:spcAft>
+                <a:spcPts val="0"/>
+              </a:spcAft>
+              <a:buFont typeface="Wingdings" panose="05000000000000000000" pitchFamily="2" charset="2"/>
+              <a:buChar char="§"/>
+            </a:pPr>
+            <a:r>
+              <a:rPr lang="en-US" dirty="0" smtClean="0"/>
+              <a:t>Some assumptions are updated regularly, others are never touched</a:t>
+            </a:r>
+          </a:p>
+          <a:p>
+            <a:pPr lvl="2">
+              <a:spcAft>
+                <a:spcPts val="0"/>
+              </a:spcAft>
+              <a:buFont typeface="Wingdings" panose="05000000000000000000" pitchFamily="2" charset="2"/>
+              <a:buChar char="§"/>
+            </a:pPr>
+            <a:endParaRPr lang="en-US" dirty="0"/>
+          </a:p>
+          <a:p>
+            <a:pPr lvl="2">
+              <a:spcAft>
+                <a:spcPts val="0"/>
+              </a:spcAft>
+              <a:buFont typeface="Wingdings" panose="05000000000000000000" pitchFamily="2" charset="2"/>
+              <a:buChar char="§"/>
+            </a:pPr>
+            <a:r>
+              <a:rPr lang="en-US" dirty="0" smtClean="0"/>
+              <a:t>Separate updated tables from static tables to make assumption updating easier</a:t>
+            </a:r>
+            <a:endParaRPr lang="en-US" dirty="0"/>
+          </a:p>
+          <a:p>
+            <a:pPr marL="457200" lvl="2" indent="0">
               <a:spcAft>
                 <a:spcPts val="0"/>
               </a:spcAft>
               <a:buNone/>
             </a:pPr>
-            <a:endParaRPr lang="en-US" i="1" dirty="0" smtClean="0"/>
+            <a:endParaRPr lang="en-US" dirty="0" smtClean="0"/>
           </a:p>
           <a:p>
             <a:pPr lvl="1">
@@ -8419,12 +8552,8 @@
               <a:buChar char="§"/>
             </a:pPr>
             <a:r>
-              <a:rPr lang="en-US" dirty="0" smtClean="0"/>
-              <a:t>3 hours  -&gt;  </a:t>
-            </a:r>
-            <a:r>
-              <a:rPr lang="en-US" b="1" dirty="0" smtClean="0"/>
-              <a:t>9 seconds in R</a:t>
+              <a:rPr lang="en-US" i="1" dirty="0" smtClean="0"/>
+              <a:t>Flexibility</a:t>
             </a:r>
           </a:p>
           <a:p>
@@ -8435,7 +8564,54 @@
               <a:buFont typeface="Wingdings" panose="05000000000000000000" pitchFamily="2" charset="2"/>
               <a:buChar char="§"/>
             </a:pPr>
-            <a:endParaRPr lang="en-US" dirty="0" smtClean="0"/>
+            <a:endParaRPr lang="en-US" i="1" dirty="0"/>
+          </a:p>
+          <a:p>
+            <a:pPr lvl="2">
+              <a:spcAft>
+                <a:spcPts val="0"/>
+              </a:spcAft>
+              <a:buFont typeface="Wingdings" panose="05000000000000000000" pitchFamily="2" charset="2"/>
+              <a:buChar char="§"/>
+            </a:pPr>
+            <a:r>
+              <a:rPr lang="en-US" dirty="0" smtClean="0"/>
+              <a:t>Needs to work for multiple lines of business</a:t>
+            </a:r>
+          </a:p>
+          <a:p>
+            <a:pPr lvl="2">
+              <a:spcAft>
+                <a:spcPts val="0"/>
+              </a:spcAft>
+              <a:buFont typeface="Wingdings" panose="05000000000000000000" pitchFamily="2" charset="2"/>
+              <a:buChar char="§"/>
+            </a:pPr>
+            <a:endParaRPr lang="en-US" i="1" dirty="0" smtClean="0"/>
+          </a:p>
+          <a:p>
+            <a:pPr lvl="2">
+              <a:spcAft>
+                <a:spcPts val="0"/>
+              </a:spcAft>
+              <a:buFont typeface="Wingdings" panose="05000000000000000000" pitchFamily="2" charset="2"/>
+              <a:buChar char="§"/>
+            </a:pPr>
+            <a:r>
+              <a:rPr lang="en-US" dirty="0" smtClean="0"/>
+              <a:t>Iterative process</a:t>
+            </a:r>
+            <a:endParaRPr lang="en-US" dirty="0"/>
+          </a:p>
+          <a:p>
+            <a:pPr lvl="2">
+              <a:spcAft>
+                <a:spcPts val="0"/>
+              </a:spcAft>
+              <a:buFont typeface="Wingdings" panose="05000000000000000000" pitchFamily="2" charset="2"/>
+              <a:buChar char="§"/>
+            </a:pPr>
+            <a:endParaRPr lang="en-US" i="1" dirty="0" smtClean="0"/>
           </a:p>
           <a:p>
             <a:pPr lvl="1">
@@ -8445,55 +8621,17 @@
               <a:buFont typeface="Wingdings" panose="05000000000000000000" pitchFamily="2" charset="2"/>
               <a:buChar char="§"/>
             </a:pPr>
-            <a:r>
-              <a:rPr lang="en-US" dirty="0" smtClean="0"/>
-              <a:t>Calculations are </a:t>
-            </a:r>
-            <a:r>
-              <a:rPr lang="en-US" i="1" dirty="0" err="1" smtClean="0"/>
-              <a:t>vectorized</a:t>
-            </a:r>
-            <a:r>
-              <a:rPr lang="en-US" i="1" dirty="0" smtClean="0"/>
-              <a:t> </a:t>
-            </a:r>
-            <a:r>
-              <a:rPr lang="en-US" dirty="0" smtClean="0"/>
-              <a:t>and run </a:t>
-            </a:r>
-            <a:r>
-              <a:rPr lang="en-US" i="1" dirty="0" smtClean="0"/>
-              <a:t>in parallel</a:t>
-            </a:r>
-          </a:p>
-          <a:p>
-            <a:pPr lvl="1">
+            <a:endParaRPr lang="en-US" i="1" dirty="0"/>
+          </a:p>
+          <a:p>
+            <a:pPr lvl="2">
               <a:spcAft>
                 <a:spcPts val="0"/>
               </a:spcAft>
               <a:buFont typeface="Wingdings" panose="05000000000000000000" pitchFamily="2" charset="2"/>
               <a:buChar char="§"/>
             </a:pPr>
-            <a:endParaRPr lang="en-US" i="1" dirty="0"/>
-          </a:p>
-          <a:p>
-            <a:pPr lvl="1">
-              <a:spcAft>
-                <a:spcPts val="0"/>
-              </a:spcAft>
-              <a:buFont typeface="Wingdings" panose="05000000000000000000" pitchFamily="2" charset="2"/>
-              <a:buChar char="§"/>
-            </a:pPr>
-            <a:r>
-              <a:rPr lang="en-US" dirty="0" smtClean="0">
-                <a:hlinkClick r:id="rId2"/>
-              </a:rPr>
-              <a:t>Report</a:t>
-            </a:r>
-            <a:r>
-              <a:rPr lang="en-US" dirty="0" smtClean="0"/>
-              <a:t> generated at the end of each run</a:t>
-            </a:r>
+            <a:endParaRPr lang="en-US" dirty="0" smtClean="0"/>
           </a:p>
         </p:txBody>
       </p:sp>
@@ -8537,7 +8675,7 @@
           <a:p>
             <a:r>
               <a:rPr lang="en-US" dirty="0" smtClean="0"/>
-              <a:t>speed</a:t>
+              <a:t>MG-ALFA</a:t>
             </a:r>
             <a:endParaRPr lang="en-US" dirty="0"/>
           </a:p>
@@ -8546,7 +8684,7 @@
     </p:spTree>
     <p:extLst>
       <p:ext uri="{BB962C8B-B14F-4D97-AF65-F5344CB8AC3E}">
-        <p14:creationId xmlns:p14="http://schemas.microsoft.com/office/powerpoint/2010/main" val="3233308965"/>
+        <p14:creationId xmlns:p14="http://schemas.microsoft.com/office/powerpoint/2010/main" val="2912860542"/>
       </p:ext>
     </p:extLst>
   </p:cSld>
@@ -8582,305 +8720,6 @@
       </p:grpSpPr>
       <p:sp>
         <p:nvSpPr>
-          <p:cNvPr id="2" name="Content Placeholder 1"/>
-          <p:cNvSpPr>
-            <a:spLocks noGrp="1"/>
-          </p:cNvSpPr>
-          <p:nvPr>
-            <p:ph idx="1"/>
-          </p:nvPr>
-        </p:nvSpPr>
-        <p:spPr/>
-        <p:txBody>
-          <a:bodyPr/>
-          <a:lstStyle/>
-          <a:p>
-            <a:pPr marL="0" indent="0">
-              <a:buNone/>
-            </a:pPr>
-            <a:r>
-              <a:rPr lang="en-US" i="1" dirty="0" smtClean="0"/>
-              <a:t>Input efficiency</a:t>
-            </a:r>
-          </a:p>
-          <a:p>
-            <a:pPr marL="0" indent="0">
-              <a:buNone/>
-            </a:pPr>
-            <a:endParaRPr lang="en-US" i="1" dirty="0"/>
-          </a:p>
-          <a:p>
-            <a:pPr>
-              <a:spcAft>
-                <a:spcPts val="0"/>
-              </a:spcAft>
-              <a:buFont typeface="Wingdings" panose="05000000000000000000" pitchFamily="2" charset="2"/>
-              <a:buChar char="§"/>
-            </a:pPr>
-            <a:r>
-              <a:rPr lang="en-US" i="1" dirty="0" smtClean="0"/>
-              <a:t>Project:</a:t>
-            </a:r>
-          </a:p>
-          <a:p>
-            <a:pPr marL="228600" lvl="1" indent="0">
-              <a:spcAft>
-                <a:spcPts val="0"/>
-              </a:spcAft>
-              <a:buNone/>
-            </a:pPr>
-            <a:endParaRPr lang="en-US" i="1" dirty="0" smtClean="0"/>
-          </a:p>
-          <a:p>
-            <a:pPr lvl="1">
-              <a:spcAft>
-                <a:spcPts val="0"/>
-              </a:spcAft>
-              <a:buFont typeface="Wingdings" panose="05000000000000000000" pitchFamily="2" charset="2"/>
-              <a:buChar char="§"/>
-            </a:pPr>
-            <a:r>
-              <a:rPr lang="en-US" i="1" dirty="0" smtClean="0"/>
-              <a:t>Efficiency – </a:t>
-            </a:r>
-            <a:r>
-              <a:rPr lang="en-US" dirty="0" smtClean="0"/>
-              <a:t>Each line of business has 1 atb2 file containing model assumptions</a:t>
-            </a:r>
-          </a:p>
-          <a:p>
-            <a:pPr lvl="1">
-              <a:spcAft>
-                <a:spcPts val="0"/>
-              </a:spcAft>
-              <a:buFont typeface="Wingdings" panose="05000000000000000000" pitchFamily="2" charset="2"/>
-              <a:buChar char="§"/>
-            </a:pPr>
-            <a:endParaRPr lang="en-US" dirty="0"/>
-          </a:p>
-          <a:p>
-            <a:pPr lvl="2">
-              <a:spcAft>
-                <a:spcPts val="0"/>
-              </a:spcAft>
-              <a:buFont typeface="Wingdings" panose="05000000000000000000" pitchFamily="2" charset="2"/>
-              <a:buChar char="§"/>
-            </a:pPr>
-            <a:r>
-              <a:rPr lang="en-US" dirty="0" smtClean="0"/>
-              <a:t>Some assumptions are updated regularly, others are never touched</a:t>
-            </a:r>
-          </a:p>
-          <a:p>
-            <a:pPr lvl="2">
-              <a:spcAft>
-                <a:spcPts val="0"/>
-              </a:spcAft>
-              <a:buFont typeface="Wingdings" panose="05000000000000000000" pitchFamily="2" charset="2"/>
-              <a:buChar char="§"/>
-            </a:pPr>
-            <a:endParaRPr lang="en-US" dirty="0"/>
-          </a:p>
-          <a:p>
-            <a:pPr lvl="2">
-              <a:spcAft>
-                <a:spcPts val="0"/>
-              </a:spcAft>
-              <a:buFont typeface="Wingdings" panose="05000000000000000000" pitchFamily="2" charset="2"/>
-              <a:buChar char="§"/>
-            </a:pPr>
-            <a:r>
-              <a:rPr lang="en-US" dirty="0" smtClean="0"/>
-              <a:t>Separate updated tables from static tables to make assumption updating easier</a:t>
-            </a:r>
-            <a:endParaRPr lang="en-US" dirty="0"/>
-          </a:p>
-          <a:p>
-            <a:pPr marL="457200" lvl="2" indent="0">
-              <a:spcAft>
-                <a:spcPts val="0"/>
-              </a:spcAft>
-              <a:buNone/>
-            </a:pPr>
-            <a:endParaRPr lang="en-US" dirty="0" smtClean="0"/>
-          </a:p>
-          <a:p>
-            <a:pPr lvl="1">
-              <a:spcAft>
-                <a:spcPts val="0"/>
-              </a:spcAft>
-              <a:buFont typeface="Wingdings" panose="05000000000000000000" pitchFamily="2" charset="2"/>
-              <a:buChar char="§"/>
-            </a:pPr>
-            <a:r>
-              <a:rPr lang="en-US" i="1" dirty="0" smtClean="0"/>
-              <a:t>Flexibility</a:t>
-            </a:r>
-          </a:p>
-          <a:p>
-            <a:pPr lvl="1">
-              <a:spcAft>
-                <a:spcPts val="0"/>
-              </a:spcAft>
-              <a:buFont typeface="Wingdings" panose="05000000000000000000" pitchFamily="2" charset="2"/>
-              <a:buChar char="§"/>
-            </a:pPr>
-            <a:endParaRPr lang="en-US" i="1" dirty="0"/>
-          </a:p>
-          <a:p>
-            <a:pPr lvl="2">
-              <a:spcAft>
-                <a:spcPts val="0"/>
-              </a:spcAft>
-              <a:buFont typeface="Wingdings" panose="05000000000000000000" pitchFamily="2" charset="2"/>
-              <a:buChar char="§"/>
-            </a:pPr>
-            <a:r>
-              <a:rPr lang="en-US" dirty="0" smtClean="0"/>
-              <a:t>Needs to work for multiple lines of business</a:t>
-            </a:r>
-          </a:p>
-          <a:p>
-            <a:pPr lvl="2">
-              <a:spcAft>
-                <a:spcPts val="0"/>
-              </a:spcAft>
-              <a:buFont typeface="Wingdings" panose="05000000000000000000" pitchFamily="2" charset="2"/>
-              <a:buChar char="§"/>
-            </a:pPr>
-            <a:endParaRPr lang="en-US" i="1" dirty="0" smtClean="0"/>
-          </a:p>
-          <a:p>
-            <a:pPr lvl="2">
-              <a:spcAft>
-                <a:spcPts val="0"/>
-              </a:spcAft>
-              <a:buFont typeface="Wingdings" panose="05000000000000000000" pitchFamily="2" charset="2"/>
-              <a:buChar char="§"/>
-            </a:pPr>
-            <a:r>
-              <a:rPr lang="en-US" dirty="0" smtClean="0"/>
-              <a:t>Iterative process</a:t>
-            </a:r>
-            <a:endParaRPr lang="en-US" dirty="0"/>
-          </a:p>
-          <a:p>
-            <a:pPr lvl="2">
-              <a:spcAft>
-                <a:spcPts val="0"/>
-              </a:spcAft>
-              <a:buFont typeface="Wingdings" panose="05000000000000000000" pitchFamily="2" charset="2"/>
-              <a:buChar char="§"/>
-            </a:pPr>
-            <a:endParaRPr lang="en-US" i="1" dirty="0" smtClean="0"/>
-          </a:p>
-          <a:p>
-            <a:pPr lvl="1">
-              <a:spcAft>
-                <a:spcPts val="0"/>
-              </a:spcAft>
-              <a:buFont typeface="Wingdings" panose="05000000000000000000" pitchFamily="2" charset="2"/>
-              <a:buChar char="§"/>
-            </a:pPr>
-            <a:endParaRPr lang="en-US" i="1" dirty="0"/>
-          </a:p>
-          <a:p>
-            <a:pPr lvl="2">
-              <a:spcAft>
-                <a:spcPts val="0"/>
-              </a:spcAft>
-              <a:buFont typeface="Wingdings" panose="05000000000000000000" pitchFamily="2" charset="2"/>
-              <a:buChar char="§"/>
-            </a:pPr>
-            <a:endParaRPr lang="en-US" dirty="0" smtClean="0"/>
-          </a:p>
-        </p:txBody>
-      </p:sp>
-      <p:sp>
-        <p:nvSpPr>
-          <p:cNvPr id="3" name="Slide Number Placeholder 2"/>
-          <p:cNvSpPr>
-            <a:spLocks noGrp="1"/>
-          </p:cNvSpPr>
-          <p:nvPr>
-            <p:ph type="sldNum" sz="quarter" idx="12"/>
-          </p:nvPr>
-        </p:nvSpPr>
-        <p:spPr/>
-        <p:txBody>
-          <a:bodyPr/>
-          <a:lstStyle/>
-          <a:p>
-            <a:fld id="{E49B4C36-CA85-496D-A067-FC602A1FD8AC}" type="slidenum">
-              <a:rPr lang="en-US" smtClean="0"/>
-              <a:t>16</a:t>
-            </a:fld>
-            <a:endParaRPr lang="en-US"/>
-          </a:p>
-        </p:txBody>
-      </p:sp>
-      <p:sp>
-        <p:nvSpPr>
-          <p:cNvPr id="4" name="Title 3"/>
-          <p:cNvSpPr>
-            <a:spLocks noGrp="1"/>
-          </p:cNvSpPr>
-          <p:nvPr>
-            <p:ph type="title"/>
-          </p:nvPr>
-        </p:nvSpPr>
-        <p:spPr/>
-        <p:txBody>
-          <a:bodyPr/>
-          <a:lstStyle/>
-          <a:p>
-            <a:r>
-              <a:rPr lang="en-US" dirty="0" smtClean="0"/>
-              <a:t>MG-ALFA</a:t>
-            </a:r>
-            <a:endParaRPr lang="en-US" dirty="0"/>
-          </a:p>
-        </p:txBody>
-      </p:sp>
-    </p:spTree>
-    <p:extLst>
-      <p:ext uri="{BB962C8B-B14F-4D97-AF65-F5344CB8AC3E}">
-        <p14:creationId xmlns:p14="http://schemas.microsoft.com/office/powerpoint/2010/main" val="2912860542"/>
-      </p:ext>
-    </p:extLst>
-  </p:cSld>
-  <p:clrMapOvr>
-    <a:masterClrMapping/>
-  </p:clrMapOvr>
-  <p:timing>
-    <p:tnLst>
-      <p:par>
-        <p:cTn id="1" dur="indefinite" restart="never" nodeType="tmRoot"/>
-      </p:par>
-    </p:tnLst>
-  </p:timing>
-</p:sld>
-</file>
-
-<file path=ppt/slides/slide17.xml><?xml version="1.0" encoding="utf-8"?>
-<p:sld xmlns:a="http://schemas.openxmlformats.org/drawingml/2006/main" xmlns:r="http://schemas.openxmlformats.org/officeDocument/2006/relationships" xmlns:p="http://schemas.openxmlformats.org/presentationml/2006/main">
-  <p:cSld>
-    <p:spTree>
-      <p:nvGrpSpPr>
-        <p:cNvPr id="1" name=""/>
-        <p:cNvGrpSpPr/>
-        <p:nvPr/>
-      </p:nvGrpSpPr>
-      <p:grpSpPr>
-        <a:xfrm>
-          <a:off x="0" y="0"/>
-          <a:ext cx="0" cy="0"/>
-          <a:chOff x="0" y="0"/>
-          <a:chExt cx="0" cy="0"/>
-        </a:xfrm>
-      </p:grpSpPr>
-      <p:sp>
-        <p:nvSpPr>
           <p:cNvPr id="34" name="Rounded Rectangle 33"/>
           <p:cNvSpPr/>
           <p:nvPr/>
@@ -9065,7 +8904,7 @@
           <a:p>
             <a:fld id="{E49B4C36-CA85-496D-A067-FC602A1FD8AC}" type="slidenum">
               <a:rPr lang="en-US" smtClean="0"/>
-              <a:t>17</a:t>
+              <a:t>16</a:t>
             </a:fld>
             <a:endParaRPr lang="en-US"/>
           </a:p>
@@ -9776,7 +9615,7 @@
 </p:sld>
 </file>
 
-<file path=ppt/slides/slide18.xml><?xml version="1.0" encoding="utf-8"?>
+<file path=ppt/slides/slide17.xml><?xml version="1.0" encoding="utf-8"?>
 <p:sld xmlns:a="http://schemas.openxmlformats.org/drawingml/2006/main" xmlns:r="http://schemas.openxmlformats.org/officeDocument/2006/relationships" xmlns:p="http://schemas.openxmlformats.org/presentationml/2006/main">
   <p:cSld>
     <p:spTree>
@@ -9979,7 +9818,7 @@
           <a:p>
             <a:fld id="{E49B4C36-CA85-496D-A067-FC602A1FD8AC}" type="slidenum">
               <a:rPr lang="en-US" smtClean="0"/>
-              <a:t>18</a:t>
+              <a:t>17</a:t>
             </a:fld>
             <a:endParaRPr lang="en-US"/>
           </a:p>
@@ -10774,6 +10613,241 @@
 </p:sld>
 </file>
 
+<file path=ppt/slides/slide18.xml><?xml version="1.0" encoding="utf-8"?>
+<p:sld xmlns:a="http://schemas.openxmlformats.org/drawingml/2006/main" xmlns:r="http://schemas.openxmlformats.org/officeDocument/2006/relationships" xmlns:p="http://schemas.openxmlformats.org/presentationml/2006/main">
+  <p:cSld>
+    <p:spTree>
+      <p:nvGrpSpPr>
+        <p:cNvPr id="1" name=""/>
+        <p:cNvGrpSpPr/>
+        <p:nvPr/>
+      </p:nvGrpSpPr>
+      <p:grpSpPr>
+        <a:xfrm>
+          <a:off x="0" y="0"/>
+          <a:ext cx="0" cy="0"/>
+          <a:chOff x="0" y="0"/>
+          <a:chExt cx="0" cy="0"/>
+        </a:xfrm>
+      </p:grpSpPr>
+      <p:sp>
+        <p:nvSpPr>
+          <p:cNvPr id="3" name="Slide Number Placeholder 2"/>
+          <p:cNvSpPr>
+            <a:spLocks noGrp="1"/>
+          </p:cNvSpPr>
+          <p:nvPr>
+            <p:ph type="sldNum" sz="quarter" idx="12"/>
+          </p:nvPr>
+        </p:nvSpPr>
+        <p:spPr/>
+        <p:txBody>
+          <a:bodyPr/>
+          <a:lstStyle/>
+          <a:p>
+            <a:fld id="{E49B4C36-CA85-496D-A067-FC602A1FD8AC}" type="slidenum">
+              <a:rPr lang="en-US" smtClean="0"/>
+              <a:t>18</a:t>
+            </a:fld>
+            <a:endParaRPr lang="en-US"/>
+          </a:p>
+        </p:txBody>
+      </p:sp>
+      <p:sp>
+        <p:nvSpPr>
+          <p:cNvPr id="4" name="Title 3"/>
+          <p:cNvSpPr>
+            <a:spLocks noGrp="1"/>
+          </p:cNvSpPr>
+          <p:nvPr>
+            <p:ph type="title"/>
+          </p:nvPr>
+        </p:nvSpPr>
+        <p:spPr/>
+        <p:txBody>
+          <a:bodyPr/>
+          <a:lstStyle/>
+          <a:p>
+            <a:r>
+              <a:rPr lang="en-US" dirty="0" smtClean="0"/>
+              <a:t>speed</a:t>
+            </a:r>
+            <a:endParaRPr lang="en-US" dirty="0"/>
+          </a:p>
+        </p:txBody>
+      </p:sp>
+      <p:sp>
+        <p:nvSpPr>
+          <p:cNvPr id="10" name="Content Placeholder 1"/>
+          <p:cNvSpPr>
+            <a:spLocks noGrp="1"/>
+          </p:cNvSpPr>
+          <p:nvPr>
+            <p:ph idx="1"/>
+          </p:nvPr>
+        </p:nvSpPr>
+        <p:spPr>
+          <a:xfrm>
+            <a:off x="320040" y="1142999"/>
+            <a:ext cx="8503920" cy="4800600"/>
+          </a:xfrm>
+        </p:spPr>
+        <p:txBody>
+          <a:bodyPr/>
+          <a:lstStyle/>
+          <a:p>
+            <a:pPr marL="0" indent="0">
+              <a:buNone/>
+            </a:pPr>
+            <a:r>
+              <a:rPr lang="en-US" i="1" dirty="0"/>
+              <a:t>Direct connections to databases</a:t>
+            </a:r>
+          </a:p>
+          <a:p>
+            <a:pPr marL="0" indent="0">
+              <a:buNone/>
+            </a:pPr>
+            <a:endParaRPr lang="en-US" i="1" dirty="0"/>
+          </a:p>
+          <a:p>
+            <a:pPr>
+              <a:spcAft>
+                <a:spcPts val="0"/>
+              </a:spcAft>
+              <a:buFont typeface="Wingdings" panose="05000000000000000000" pitchFamily="2" charset="2"/>
+              <a:buChar char="§"/>
+            </a:pPr>
+            <a:r>
+              <a:rPr lang="en-US" i="1" dirty="0" smtClean="0"/>
+              <a:t>Project:</a:t>
+            </a:r>
+          </a:p>
+          <a:p>
+            <a:pPr marL="228600" lvl="1" indent="0">
+              <a:spcAft>
+                <a:spcPts val="0"/>
+              </a:spcAft>
+              <a:buNone/>
+            </a:pPr>
+            <a:endParaRPr lang="en-US" i="1" dirty="0" smtClean="0"/>
+          </a:p>
+          <a:p>
+            <a:pPr lvl="1">
+              <a:buFont typeface="Wingdings" panose="05000000000000000000" pitchFamily="2" charset="2"/>
+              <a:buChar char="§"/>
+            </a:pPr>
+            <a:r>
+              <a:rPr lang="en-US" dirty="0" smtClean="0"/>
+              <a:t>Tackling a problem we all have. Working with databases from Excel/VBA isn’t fun.</a:t>
+            </a:r>
+          </a:p>
+          <a:p>
+            <a:pPr lvl="1">
+              <a:buFont typeface="Wingdings" panose="05000000000000000000" pitchFamily="2" charset="2"/>
+              <a:buChar char="§"/>
+            </a:pPr>
+            <a:endParaRPr lang="en-US" dirty="0" smtClean="0"/>
+          </a:p>
+          <a:p>
+            <a:pPr lvl="1">
+              <a:buFont typeface="Wingdings" panose="05000000000000000000" pitchFamily="2" charset="2"/>
+              <a:buChar char="§"/>
+            </a:pPr>
+            <a:r>
+              <a:rPr lang="en-US" dirty="0" smtClean="0"/>
+              <a:t>Great support in R for connecting to </a:t>
+            </a:r>
+            <a:r>
+              <a:rPr lang="en-US" i="1" dirty="0" smtClean="0"/>
+              <a:t>any</a:t>
+            </a:r>
+            <a:r>
+              <a:rPr lang="en-US" dirty="0" smtClean="0"/>
+              <a:t> type of database</a:t>
+            </a:r>
+          </a:p>
+          <a:p>
+            <a:pPr lvl="1">
+              <a:buFont typeface="Wingdings" panose="05000000000000000000" pitchFamily="2" charset="2"/>
+              <a:buChar char="§"/>
+            </a:pPr>
+            <a:endParaRPr lang="en-US" dirty="0"/>
+          </a:p>
+          <a:p>
+            <a:pPr lvl="3">
+              <a:buFont typeface="Wingdings" panose="05000000000000000000" pitchFamily="2" charset="2"/>
+              <a:buChar char="§"/>
+            </a:pPr>
+            <a:r>
+              <a:rPr lang="en-US" dirty="0" smtClean="0"/>
+              <a:t>There just needs to be a “SQL translation” </a:t>
+            </a:r>
+          </a:p>
+          <a:p>
+            <a:pPr lvl="1">
+              <a:buFont typeface="Wingdings" panose="05000000000000000000" pitchFamily="2" charset="2"/>
+              <a:buChar char="§"/>
+            </a:pPr>
+            <a:endParaRPr lang="en-US" dirty="0"/>
+          </a:p>
+          <a:p>
+            <a:pPr lvl="3">
+              <a:buFont typeface="Wingdings" panose="05000000000000000000" pitchFamily="2" charset="2"/>
+              <a:buChar char="§"/>
+            </a:pPr>
+            <a:r>
+              <a:rPr lang="en-US" dirty="0" smtClean="0"/>
+              <a:t>Added that SQL translation for Access </a:t>
+            </a:r>
+          </a:p>
+          <a:p>
+            <a:pPr marL="685800" lvl="3" indent="0">
+              <a:buNone/>
+            </a:pPr>
+            <a:endParaRPr lang="en-US" dirty="0" smtClean="0"/>
+          </a:p>
+          <a:p>
+            <a:pPr lvl="1">
+              <a:buFont typeface="Wingdings" panose="05000000000000000000" pitchFamily="2" charset="2"/>
+              <a:buChar char="§"/>
+            </a:pPr>
+            <a:r>
+              <a:rPr lang="en-US" dirty="0" smtClean="0">
+                <a:hlinkClick r:id="rId2"/>
+              </a:rPr>
+              <a:t>Let’s have some fun</a:t>
+            </a:r>
+            <a:endParaRPr lang="en-US" dirty="0"/>
+          </a:p>
+          <a:p>
+            <a:pPr marL="685800" lvl="3" indent="0">
+              <a:buNone/>
+            </a:pPr>
+            <a:endParaRPr lang="en-US" dirty="0" smtClean="0"/>
+          </a:p>
+        </p:txBody>
+      </p:sp>
+    </p:spTree>
+    <p:extLst>
+      <p:ext uri="{BB962C8B-B14F-4D97-AF65-F5344CB8AC3E}">
+        <p14:creationId xmlns:p14="http://schemas.microsoft.com/office/powerpoint/2010/main" val="4151441797"/>
+      </p:ext>
+    </p:extLst>
+  </p:cSld>
+  <p:clrMapOvr>
+    <a:masterClrMapping/>
+  </p:clrMapOvr>
+  <p:timing>
+    <p:tnLst>
+      <p:par>
+        <p:cTn id="1" dur="indefinite" restart="never" nodeType="tmRoot"/>
+      </p:par>
+    </p:tnLst>
+  </p:timing>
+</p:sld>
+</file>
+
 <file path=ppt/slides/slide19.xml><?xml version="1.0" encoding="utf-8"?>
 <p:sld xmlns:a="http://schemas.openxmlformats.org/drawingml/2006/main" xmlns:r="http://schemas.openxmlformats.org/officeDocument/2006/relationships" xmlns:p="http://schemas.openxmlformats.org/presentationml/2006/main">
   <p:cSld>
@@ -10793,6 +10867,53 @@
       </p:grpSpPr>
       <p:sp>
         <p:nvSpPr>
+          <p:cNvPr id="2" name="Content Placeholder 1"/>
+          <p:cNvSpPr>
+            <a:spLocks noGrp="1"/>
+          </p:cNvSpPr>
+          <p:nvPr>
+            <p:ph idx="1"/>
+          </p:nvPr>
+        </p:nvSpPr>
+        <p:spPr/>
+        <p:txBody>
+          <a:bodyPr/>
+          <a:lstStyle/>
+          <a:p>
+            <a:pPr marL="0" indent="0">
+              <a:buNone/>
+            </a:pPr>
+            <a:r>
+              <a:rPr lang="en-US" i="1" dirty="0" smtClean="0"/>
+              <a:t>Direct connections to databases</a:t>
+            </a:r>
+          </a:p>
+          <a:p>
+            <a:pPr marL="0" indent="0">
+              <a:buNone/>
+            </a:pPr>
+            <a:endParaRPr lang="en-US" i="1" dirty="0"/>
+          </a:p>
+          <a:p>
+            <a:pPr>
+              <a:buFont typeface="Wingdings" panose="05000000000000000000" pitchFamily="2" charset="2"/>
+              <a:buChar char="§"/>
+            </a:pPr>
+            <a:r>
+              <a:rPr lang="en-US" i="1" dirty="0" smtClean="0"/>
+              <a:t>Benefits:</a:t>
+            </a:r>
+          </a:p>
+          <a:p>
+            <a:pPr marL="228600" lvl="1" indent="0">
+              <a:buNone/>
+            </a:pPr>
+            <a:endParaRPr lang="en-US" i="1" dirty="0"/>
+          </a:p>
+        </p:txBody>
+      </p:sp>
+      <p:sp>
+        <p:nvSpPr>
           <p:cNvPr id="3" name="Slide Number Placeholder 2"/>
           <p:cNvSpPr>
             <a:spLocks noGrp="1"/>
@@ -10830,169 +10951,76 @@
           <a:lstStyle/>
           <a:p>
             <a:r>
-              <a:rPr lang="en-US" dirty="0" smtClean="0"/>
+              <a:rPr lang="en-US" dirty="0"/>
               <a:t>speed</a:t>
             </a:r>
-            <a:endParaRPr lang="en-US" dirty="0"/>
-          </a:p>
-        </p:txBody>
-      </p:sp>
-      <p:sp>
-        <p:nvSpPr>
-          <p:cNvPr id="10" name="Content Placeholder 1"/>
-          <p:cNvSpPr>
-            <a:spLocks noGrp="1"/>
-          </p:cNvSpPr>
-          <p:nvPr>
-            <p:ph idx="1"/>
-          </p:nvPr>
-        </p:nvSpPr>
+          </a:p>
+        </p:txBody>
+      </p:sp>
+      <p:pic>
+        <p:nvPicPr>
+          <p:cNvPr id="5" name="Picture 4"/>
+          <p:cNvPicPr>
+            <a:picLocks noChangeAspect="1"/>
+          </p:cNvPicPr>
+          <p:nvPr/>
+        </p:nvPicPr>
+        <p:blipFill>
+          <a:blip r:embed="rId2">
+            <a:extLst>
+              <a:ext uri="{28A0092B-C50C-407E-A947-70E740481C1C}">
+                <a14:useLocalDpi xmlns:a14="http://schemas.microsoft.com/office/drawing/2010/main" val="0"/>
+              </a:ext>
+            </a:extLst>
+          </a:blip>
+          <a:stretch>
+            <a:fillRect/>
+          </a:stretch>
+        </p:blipFill>
         <p:spPr>
           <a:xfrm>
-            <a:off x="320040" y="1142999"/>
-            <a:ext cx="8503920" cy="4800600"/>
-          </a:xfrm>
+            <a:off x="457201" y="2514600"/>
+            <a:ext cx="5236756" cy="2686212"/>
+          </a:xfrm>
+          <a:prstGeom prst="rect">
+            <a:avLst/>
+          </a:prstGeom>
         </p:spPr>
-        <p:txBody>
-          <a:bodyPr/>
-          <a:lstStyle/>
-          <a:p>
-            <a:pPr marL="0" indent="0">
-              <a:buNone/>
-            </a:pPr>
-            <a:r>
-              <a:rPr lang="en-US" i="1" dirty="0"/>
-              <a:t>Direct connections to databases</a:t>
-            </a:r>
-          </a:p>
-          <a:p>
-            <a:pPr marL="0" indent="0">
-              <a:buNone/>
-            </a:pPr>
-            <a:endParaRPr lang="en-US" i="1" dirty="0"/>
-          </a:p>
-          <a:p>
-            <a:pPr>
-              <a:spcAft>
-                <a:spcPts val="0"/>
-              </a:spcAft>
-              <a:buFont typeface="Wingdings" panose="05000000000000000000" pitchFamily="2" charset="2"/>
-              <a:buChar char="§"/>
-            </a:pPr>
-            <a:r>
-              <a:rPr lang="en-US" i="1" dirty="0" smtClean="0"/>
-              <a:t>Project:</a:t>
-            </a:r>
-          </a:p>
-          <a:p>
-            <a:pPr marL="228600" lvl="1" indent="0">
-              <a:spcAft>
-                <a:spcPts val="0"/>
-              </a:spcAft>
-              <a:buNone/>
-            </a:pPr>
-            <a:endParaRPr lang="en-US" i="1" dirty="0" smtClean="0"/>
-          </a:p>
-          <a:p>
-            <a:pPr lvl="1">
-              <a:buFont typeface="Wingdings" panose="05000000000000000000" pitchFamily="2" charset="2"/>
-              <a:buChar char="§"/>
-            </a:pPr>
-            <a:r>
-              <a:rPr lang="en-US" dirty="0" smtClean="0"/>
-              <a:t>Tackling a problem we all have. Working with databases from Excel/VBA isn’t fun.</a:t>
-            </a:r>
-          </a:p>
-          <a:p>
-            <a:pPr lvl="1">
-              <a:buFont typeface="Wingdings" panose="05000000000000000000" pitchFamily="2" charset="2"/>
-              <a:buChar char="§"/>
-            </a:pPr>
-            <a:endParaRPr lang="en-US" dirty="0" smtClean="0"/>
-          </a:p>
-          <a:p>
-            <a:pPr lvl="1">
-              <a:buFont typeface="Wingdings" panose="05000000000000000000" pitchFamily="2" charset="2"/>
-              <a:buChar char="§"/>
-            </a:pPr>
-            <a:r>
-              <a:rPr lang="en-US" dirty="0" smtClean="0"/>
-              <a:t>Great support in R for connecting to </a:t>
-            </a:r>
-            <a:r>
-              <a:rPr lang="en-US" i="1" dirty="0" smtClean="0"/>
-              <a:t>any</a:t>
-            </a:r>
-            <a:r>
-              <a:rPr lang="en-US" dirty="0" smtClean="0"/>
-              <a:t> type of database</a:t>
-            </a:r>
-          </a:p>
-          <a:p>
-            <a:pPr lvl="1">
-              <a:buFont typeface="Wingdings" panose="05000000000000000000" pitchFamily="2" charset="2"/>
-              <a:buChar char="§"/>
-            </a:pPr>
-            <a:endParaRPr lang="en-US" dirty="0"/>
-          </a:p>
-          <a:p>
-            <a:pPr lvl="3">
-              <a:buFont typeface="Wingdings" panose="05000000000000000000" pitchFamily="2" charset="2"/>
-              <a:buChar char="§"/>
-            </a:pPr>
-            <a:r>
-              <a:rPr lang="en-US" dirty="0" smtClean="0"/>
-              <a:t>There just needs to be a “SQL translation” </a:t>
-            </a:r>
-          </a:p>
-          <a:p>
-            <a:pPr lvl="1">
-              <a:buFont typeface="Wingdings" panose="05000000000000000000" pitchFamily="2" charset="2"/>
-              <a:buChar char="§"/>
-            </a:pPr>
-            <a:endParaRPr lang="en-US" dirty="0"/>
-          </a:p>
-          <a:p>
-            <a:pPr lvl="3">
-              <a:buFont typeface="Wingdings" panose="05000000000000000000" pitchFamily="2" charset="2"/>
-              <a:buChar char="§"/>
-            </a:pPr>
-            <a:r>
-              <a:rPr lang="en-US" dirty="0" smtClean="0"/>
-              <a:t>Added that SQL translation for Access </a:t>
-            </a:r>
-          </a:p>
-          <a:p>
-            <a:pPr marL="685800" lvl="3" indent="0">
-              <a:buNone/>
-            </a:pPr>
-            <a:endParaRPr lang="en-US" dirty="0" smtClean="0"/>
-          </a:p>
-          <a:p>
-            <a:pPr lvl="1">
-              <a:buFont typeface="Wingdings" panose="05000000000000000000" pitchFamily="2" charset="2"/>
-              <a:buChar char="§"/>
-            </a:pPr>
-            <a:r>
-              <a:rPr lang="en-US" dirty="0" smtClean="0">
-                <a:hlinkClick r:id="rId2"/>
-              </a:rPr>
-              <a:t>Let’s have some fun</a:t>
-            </a:r>
-            <a:endParaRPr lang="en-US" dirty="0"/>
-          </a:p>
-          <a:p>
-            <a:pPr marL="685800" lvl="3" indent="0">
-              <a:buNone/>
-            </a:pPr>
-            <a:endParaRPr lang="en-US" dirty="0" smtClean="0"/>
-          </a:p>
-        </p:txBody>
-      </p:sp>
+      </p:pic>
+      <p:pic>
+        <p:nvPicPr>
+          <p:cNvPr id="6" name="Picture 5"/>
+          <p:cNvPicPr>
+            <a:picLocks noChangeAspect="1"/>
+          </p:cNvPicPr>
+          <p:nvPr/>
+        </p:nvPicPr>
+        <p:blipFill>
+          <a:blip r:embed="rId3">
+            <a:extLst>
+              <a:ext uri="{28A0092B-C50C-407E-A947-70E740481C1C}">
+                <a14:useLocalDpi xmlns:a14="http://schemas.microsoft.com/office/drawing/2010/main" val="0"/>
+              </a:ext>
+            </a:extLst>
+          </a:blip>
+          <a:stretch>
+            <a:fillRect/>
+          </a:stretch>
+        </p:blipFill>
+        <p:spPr>
+          <a:xfrm>
+            <a:off x="6248400" y="2514600"/>
+            <a:ext cx="2247900" cy="2247900"/>
+          </a:xfrm>
+          <a:prstGeom prst="rect">
+            <a:avLst/>
+          </a:prstGeom>
+        </p:spPr>
+      </p:pic>
     </p:spTree>
     <p:extLst>
       <p:ext uri="{BB962C8B-B14F-4D97-AF65-F5344CB8AC3E}">
-        <p14:creationId xmlns:p14="http://schemas.microsoft.com/office/powerpoint/2010/main" val="4151441797"/>
+        <p14:creationId xmlns:p14="http://schemas.microsoft.com/office/powerpoint/2010/main" val="224078259"/>
       </p:ext>
     </p:extLst>
   </p:cSld>
@@ -11249,7 +11277,7 @@
               <a:buNone/>
             </a:pPr>
             <a:r>
-              <a:rPr lang="en-US" i="1" dirty="0" smtClean="0"/>
+              <a:rPr lang="en-US" i="1" dirty="0"/>
               <a:t>Direct connections to databases</a:t>
             </a:r>
           </a:p>
@@ -11295,195 +11323,6 @@
             <a:fld id="{E49B4C36-CA85-496D-A067-FC602A1FD8AC}" type="slidenum">
               <a:rPr lang="en-US" smtClean="0"/>
               <a:t>20</a:t>
-            </a:fld>
-            <a:endParaRPr lang="en-US"/>
-          </a:p>
-        </p:txBody>
-      </p:sp>
-      <p:sp>
-        <p:nvSpPr>
-          <p:cNvPr id="4" name="Title 3"/>
-          <p:cNvSpPr>
-            <a:spLocks noGrp="1"/>
-          </p:cNvSpPr>
-          <p:nvPr>
-            <p:ph type="title"/>
-          </p:nvPr>
-        </p:nvSpPr>
-        <p:spPr/>
-        <p:txBody>
-          <a:bodyPr/>
-          <a:lstStyle/>
-          <a:p>
-            <a:r>
-              <a:rPr lang="en-US" dirty="0"/>
-              <a:t>speed</a:t>
-            </a:r>
-          </a:p>
-        </p:txBody>
-      </p:sp>
-      <p:pic>
-        <p:nvPicPr>
-          <p:cNvPr id="5" name="Picture 4"/>
-          <p:cNvPicPr>
-            <a:picLocks noChangeAspect="1"/>
-          </p:cNvPicPr>
-          <p:nvPr/>
-        </p:nvPicPr>
-        <p:blipFill>
-          <a:blip r:embed="rId2">
-            <a:extLst>
-              <a:ext uri="{28A0092B-C50C-407E-A947-70E740481C1C}">
-                <a14:useLocalDpi xmlns:a14="http://schemas.microsoft.com/office/drawing/2010/main" val="0"/>
-              </a:ext>
-            </a:extLst>
-          </a:blip>
-          <a:stretch>
-            <a:fillRect/>
-          </a:stretch>
-        </p:blipFill>
-        <p:spPr>
-          <a:xfrm>
-            <a:off x="457201" y="2514600"/>
-            <a:ext cx="5236756" cy="2686212"/>
-          </a:xfrm>
-          <a:prstGeom prst="rect">
-            <a:avLst/>
-          </a:prstGeom>
-        </p:spPr>
-      </p:pic>
-      <p:pic>
-        <p:nvPicPr>
-          <p:cNvPr id="6" name="Picture 5"/>
-          <p:cNvPicPr>
-            <a:picLocks noChangeAspect="1"/>
-          </p:cNvPicPr>
-          <p:nvPr/>
-        </p:nvPicPr>
-        <p:blipFill>
-          <a:blip r:embed="rId3">
-            <a:extLst>
-              <a:ext uri="{28A0092B-C50C-407E-A947-70E740481C1C}">
-                <a14:useLocalDpi xmlns:a14="http://schemas.microsoft.com/office/drawing/2010/main" val="0"/>
-              </a:ext>
-            </a:extLst>
-          </a:blip>
-          <a:stretch>
-            <a:fillRect/>
-          </a:stretch>
-        </p:blipFill>
-        <p:spPr>
-          <a:xfrm>
-            <a:off x="6248400" y="2514600"/>
-            <a:ext cx="2247900" cy="2247900"/>
-          </a:xfrm>
-          <a:prstGeom prst="rect">
-            <a:avLst/>
-          </a:prstGeom>
-        </p:spPr>
-      </p:pic>
-    </p:spTree>
-    <p:extLst>
-      <p:ext uri="{BB962C8B-B14F-4D97-AF65-F5344CB8AC3E}">
-        <p14:creationId xmlns:p14="http://schemas.microsoft.com/office/powerpoint/2010/main" val="224078259"/>
-      </p:ext>
-    </p:extLst>
-  </p:cSld>
-  <p:clrMapOvr>
-    <a:masterClrMapping/>
-  </p:clrMapOvr>
-  <p:timing>
-    <p:tnLst>
-      <p:par>
-        <p:cTn id="1" dur="indefinite" restart="never" nodeType="tmRoot"/>
-      </p:par>
-    </p:tnLst>
-  </p:timing>
-</p:sld>
-</file>
-
-<file path=ppt/slides/slide21.xml><?xml version="1.0" encoding="utf-8"?>
-<p:sld xmlns:a="http://schemas.openxmlformats.org/drawingml/2006/main" xmlns:r="http://schemas.openxmlformats.org/officeDocument/2006/relationships" xmlns:p="http://schemas.openxmlformats.org/presentationml/2006/main">
-  <p:cSld>
-    <p:spTree>
-      <p:nvGrpSpPr>
-        <p:cNvPr id="1" name=""/>
-        <p:cNvGrpSpPr/>
-        <p:nvPr/>
-      </p:nvGrpSpPr>
-      <p:grpSpPr>
-        <a:xfrm>
-          <a:off x="0" y="0"/>
-          <a:ext cx="0" cy="0"/>
-          <a:chOff x="0" y="0"/>
-          <a:chExt cx="0" cy="0"/>
-        </a:xfrm>
-      </p:grpSpPr>
-      <p:sp>
-        <p:nvSpPr>
-          <p:cNvPr id="2" name="Content Placeholder 1"/>
-          <p:cNvSpPr>
-            <a:spLocks noGrp="1"/>
-          </p:cNvSpPr>
-          <p:nvPr>
-            <p:ph idx="1"/>
-          </p:nvPr>
-        </p:nvSpPr>
-        <p:spPr/>
-        <p:txBody>
-          <a:bodyPr/>
-          <a:lstStyle/>
-          <a:p>
-            <a:pPr marL="0" indent="0">
-              <a:buNone/>
-            </a:pPr>
-            <a:r>
-              <a:rPr lang="en-US" i="1" dirty="0"/>
-              <a:t>Direct connections to databases</a:t>
-            </a:r>
-          </a:p>
-          <a:p>
-            <a:pPr marL="0" indent="0">
-              <a:buNone/>
-            </a:pPr>
-            <a:endParaRPr lang="en-US" i="1" dirty="0"/>
-          </a:p>
-          <a:p>
-            <a:pPr>
-              <a:buFont typeface="Wingdings" panose="05000000000000000000" pitchFamily="2" charset="2"/>
-              <a:buChar char="§"/>
-            </a:pPr>
-            <a:r>
-              <a:rPr lang="en-US" i="1" dirty="0" smtClean="0"/>
-              <a:t>Benefits:</a:t>
-            </a:r>
-          </a:p>
-          <a:p>
-            <a:pPr marL="228600" lvl="1" indent="0">
-              <a:buNone/>
-            </a:pPr>
-            <a:endParaRPr lang="en-US" i="1" dirty="0"/>
-          </a:p>
-        </p:txBody>
-      </p:sp>
-      <p:sp>
-        <p:nvSpPr>
-          <p:cNvPr id="3" name="Slide Number Placeholder 2"/>
-          <p:cNvSpPr>
-            <a:spLocks noGrp="1"/>
-          </p:cNvSpPr>
-          <p:nvPr>
-            <p:ph type="sldNum" sz="quarter" idx="12"/>
-          </p:nvPr>
-        </p:nvSpPr>
-        <p:spPr/>
-        <p:txBody>
-          <a:bodyPr/>
-          <a:lstStyle/>
-          <a:p>
-            <a:fld id="{E49B4C36-CA85-496D-A067-FC602A1FD8AC}" type="slidenum">
-              <a:rPr lang="en-US" smtClean="0"/>
-              <a:t>21</a:t>
             </a:fld>
             <a:endParaRPr lang="en-US"/>
           </a:p>
@@ -11693,7 +11532,7 @@
 </p:sld>
 </file>
 
-<file path=ppt/slides/slide22.xml><?xml version="1.0" encoding="utf-8"?>
+<file path=ppt/slides/slide21.xml><?xml version="1.0" encoding="utf-8"?>
 <p:sld xmlns:a="http://schemas.openxmlformats.org/drawingml/2006/main" xmlns:r="http://schemas.openxmlformats.org/officeDocument/2006/relationships" xmlns:p="http://schemas.openxmlformats.org/presentationml/2006/main">
   <p:cSld>
     <p:spTree>
@@ -11860,7 +11699,7 @@
           <a:p>
             <a:fld id="{E49B4C36-CA85-496D-A067-FC602A1FD8AC}" type="slidenum">
               <a:rPr lang="en-US" smtClean="0"/>
-              <a:t>22</a:t>
+              <a:t>21</a:t>
             </a:fld>
             <a:endParaRPr lang="en-US"/>
           </a:p>
@@ -11939,7 +11778,7 @@
 </p:sld>
 </file>
 
-<file path=ppt/slides/slide23.xml><?xml version="1.0" encoding="utf-8"?>
+<file path=ppt/slides/slide22.xml><?xml version="1.0" encoding="utf-8"?>
 <p:sld xmlns:a="http://schemas.openxmlformats.org/drawingml/2006/main" xmlns:r="http://schemas.openxmlformats.org/officeDocument/2006/relationships" xmlns:p="http://schemas.openxmlformats.org/presentationml/2006/main">
   <p:cSld>
     <p:spTree>
@@ -13065,50 +12904,6 @@
               <a:buChar char="§"/>
             </a:pPr>
             <a:endParaRPr lang="en-US" dirty="0"/>
-          </a:p>
-          <a:p>
-            <a:pPr lvl="1">
-              <a:spcAft>
-                <a:spcPts val="1200"/>
-              </a:spcAft>
-              <a:buFont typeface="Wingdings" panose="05000000000000000000" pitchFamily="2" charset="2"/>
-              <a:buChar char="§"/>
-            </a:pPr>
-            <a:r>
-              <a:rPr lang="en-US" i="1" dirty="0" smtClean="0"/>
-              <a:t>Fully reproducible </a:t>
-            </a:r>
-            <a:r>
-              <a:rPr lang="en-US" dirty="0" smtClean="0"/>
-              <a:t>– Easily step through the intermediate data cleaning steps.</a:t>
-            </a:r>
-            <a:endParaRPr lang="en-US" dirty="0"/>
-          </a:p>
-          <a:p>
-            <a:pPr lvl="4">
-              <a:spcAft>
-                <a:spcPts val="1200"/>
-              </a:spcAft>
-              <a:buFont typeface="Wingdings" panose="05000000000000000000" pitchFamily="2" charset="2"/>
-              <a:buChar char="§"/>
-            </a:pPr>
-            <a:r>
-              <a:rPr lang="en-US" dirty="0" smtClean="0"/>
-              <a:t>Well-documented code, easy to understand</a:t>
-            </a:r>
-          </a:p>
-          <a:p>
-            <a:pPr lvl="4">
-              <a:spcAft>
-                <a:spcPts val="1200"/>
-              </a:spcAft>
-              <a:buFont typeface="Wingdings" panose="05000000000000000000" pitchFamily="2" charset="2"/>
-              <a:buChar char="§"/>
-            </a:pPr>
-            <a:r>
-              <a:rPr lang="en-US" i="1" dirty="0" smtClean="0"/>
-              <a:t>Not trying to understand a complex formula reference in an Excel document</a:t>
-            </a:r>
           </a:p>
         </p:txBody>
       </p:sp>

</xml_diff>

<commit_message>
add exams. shorten db connection
</commit_message>
<xml_diff>
--- a/final-presentation/final-presentation-davis-vaughan.pptx
+++ b/final-presentation/final-presentation-davis-vaughan.pptx
@@ -5,10 +5,10 @@
     <p:sldMasterId id="2147483648" r:id="rId1"/>
   </p:sldMasterIdLst>
   <p:notesMasterIdLst>
-    <p:notesMasterId r:id="rId24"/>
+    <p:notesMasterId r:id="rId25"/>
   </p:notesMasterIdLst>
   <p:handoutMasterIdLst>
-    <p:handoutMasterId r:id="rId25"/>
+    <p:handoutMasterId r:id="rId26"/>
   </p:handoutMasterIdLst>
   <p:sldIdLst>
     <p:sldId id="256" r:id="rId2"/>
@@ -29,27 +29,28 @@
     <p:sldId id="280" r:id="rId17"/>
     <p:sldId id="279" r:id="rId18"/>
     <p:sldId id="281" r:id="rId19"/>
-    <p:sldId id="282" r:id="rId20"/>
-    <p:sldId id="283" r:id="rId21"/>
-    <p:sldId id="273" r:id="rId22"/>
-    <p:sldId id="284" r:id="rId23"/>
+    <p:sldId id="288" r:id="rId20"/>
+    <p:sldId id="282" r:id="rId21"/>
+    <p:sldId id="283" r:id="rId22"/>
+    <p:sldId id="273" r:id="rId23"/>
+    <p:sldId id="284" r:id="rId24"/>
   </p:sldIdLst>
   <p:sldSz cx="9144000" cy="6858000" type="screen4x3"/>
   <p:notesSz cx="6858000" cy="9144000"/>
   <p:embeddedFontLst>
     <p:embeddedFont>
-      <p:font typeface="Aparajita" panose="020B0604020202020204" pitchFamily="34" charset="0"/>
-      <p:regular r:id="rId26"/>
-      <p:bold r:id="rId27"/>
-      <p:italic r:id="rId28"/>
-      <p:boldItalic r:id="rId29"/>
+      <p:font typeface="Calibri" panose="020F0502020204030204" pitchFamily="34" charset="0"/>
+      <p:regular r:id="rId27"/>
+      <p:bold r:id="rId28"/>
+      <p:italic r:id="rId29"/>
+      <p:boldItalic r:id="rId30"/>
     </p:embeddedFont>
     <p:embeddedFont>
-      <p:font typeface="Calibri" panose="020F0502020204030204" pitchFamily="34" charset="0"/>
-      <p:regular r:id="rId30"/>
-      <p:bold r:id="rId31"/>
-      <p:italic r:id="rId32"/>
-      <p:boldItalic r:id="rId33"/>
+      <p:font typeface="Aparajita" panose="020B0604020202020204" pitchFamily="34" charset="0"/>
+      <p:regular r:id="rId31"/>
+      <p:bold r:id="rId32"/>
+      <p:italic r:id="rId33"/>
+      <p:boldItalic r:id="rId34"/>
     </p:embeddedFont>
   </p:embeddedFontLst>
   <p:defaultTextStyle>
@@ -232,7 +233,7 @@
           <a:p>
             <a:fld id="{8842975B-7FDA-46E0-824B-94BBC253277E}" type="datetimeFigureOut">
               <a:rPr lang="en-US" smtClean="0"/>
-              <a:t>7/21/2017</a:t>
+              <a:t>7/24/2017</a:t>
             </a:fld>
             <a:endParaRPr lang="en-US"/>
           </a:p>
@@ -420,7 +421,7 @@
           <a:p>
             <a:fld id="{D03BB3A9-8F42-45F7-91DC-AC49755E9D08}" type="datetimeFigureOut">
               <a:rPr lang="en-US" smtClean="0"/>
-              <a:t>7/21/2017</a:t>
+              <a:t>7/24/2017</a:t>
             </a:fld>
             <a:endParaRPr lang="en-US"/>
           </a:p>
@@ -10801,31 +10802,6 @@
               <a:t>Added that SQL translation for Access </a:t>
             </a:r>
           </a:p>
-          <a:p>
-            <a:pPr marL="685800" lvl="3" indent="0">
-              <a:buNone/>
-            </a:pPr>
-            <a:endParaRPr lang="en-US" dirty="0" smtClean="0"/>
-          </a:p>
-          <a:p>
-            <a:pPr lvl="1">
-              <a:buFont typeface="Wingdings" panose="05000000000000000000" pitchFamily="2" charset="2"/>
-              <a:buChar char="§"/>
-            </a:pPr>
-            <a:r>
-              <a:rPr lang="en-US" dirty="0" smtClean="0">
-                <a:hlinkClick r:id="rId2"/>
-              </a:rPr>
-              <a:t>Let’s have some fun</a:t>
-            </a:r>
-            <a:endParaRPr lang="en-US" dirty="0"/>
-          </a:p>
-          <a:p>
-            <a:pPr marL="685800" lvl="3" indent="0">
-              <a:buNone/>
-            </a:pPr>
-            <a:endParaRPr lang="en-US" dirty="0" smtClean="0"/>
-          </a:p>
         </p:txBody>
       </p:sp>
     </p:spTree>
@@ -10867,53 +10843,6 @@
       </p:grpSpPr>
       <p:sp>
         <p:nvSpPr>
-          <p:cNvPr id="2" name="Content Placeholder 1"/>
-          <p:cNvSpPr>
-            <a:spLocks noGrp="1"/>
-          </p:cNvSpPr>
-          <p:nvPr>
-            <p:ph idx="1"/>
-          </p:nvPr>
-        </p:nvSpPr>
-        <p:spPr/>
-        <p:txBody>
-          <a:bodyPr/>
-          <a:lstStyle/>
-          <a:p>
-            <a:pPr marL="0" indent="0">
-              <a:buNone/>
-            </a:pPr>
-            <a:r>
-              <a:rPr lang="en-US" i="1" dirty="0" smtClean="0"/>
-              <a:t>Direct connections to databases</a:t>
-            </a:r>
-          </a:p>
-          <a:p>
-            <a:pPr marL="0" indent="0">
-              <a:buNone/>
-            </a:pPr>
-            <a:endParaRPr lang="en-US" i="1" dirty="0"/>
-          </a:p>
-          <a:p>
-            <a:pPr>
-              <a:buFont typeface="Wingdings" panose="05000000000000000000" pitchFamily="2" charset="2"/>
-              <a:buChar char="§"/>
-            </a:pPr>
-            <a:r>
-              <a:rPr lang="en-US" i="1" dirty="0" smtClean="0"/>
-              <a:t>Benefits:</a:t>
-            </a:r>
-          </a:p>
-          <a:p>
-            <a:pPr marL="228600" lvl="1" indent="0">
-              <a:buNone/>
-            </a:pPr>
-            <a:endParaRPr lang="en-US" i="1" dirty="0"/>
-          </a:p>
-        </p:txBody>
-      </p:sp>
-      <p:sp>
-        <p:nvSpPr>
           <p:cNvPr id="3" name="Slide Number Placeholder 2"/>
           <p:cNvSpPr>
             <a:spLocks noGrp="1"/>
@@ -10951,76 +10880,169 @@
           <a:lstStyle/>
           <a:p>
             <a:r>
-              <a:rPr lang="en-US" dirty="0"/>
+              <a:rPr lang="en-US" dirty="0" smtClean="0"/>
               <a:t>speed</a:t>
             </a:r>
-          </a:p>
-        </p:txBody>
-      </p:sp>
-      <p:pic>
-        <p:nvPicPr>
-          <p:cNvPr id="5" name="Picture 4"/>
-          <p:cNvPicPr>
-            <a:picLocks noChangeAspect="1"/>
-          </p:cNvPicPr>
-          <p:nvPr/>
-        </p:nvPicPr>
-        <p:blipFill>
-          <a:blip r:embed="rId2">
-            <a:extLst>
-              <a:ext uri="{28A0092B-C50C-407E-A947-70E740481C1C}">
-                <a14:useLocalDpi xmlns:a14="http://schemas.microsoft.com/office/drawing/2010/main" val="0"/>
-              </a:ext>
-            </a:extLst>
-          </a:blip>
-          <a:stretch>
-            <a:fillRect/>
-          </a:stretch>
-        </p:blipFill>
+            <a:endParaRPr lang="en-US" dirty="0"/>
+          </a:p>
+        </p:txBody>
+      </p:sp>
+      <p:sp>
+        <p:nvSpPr>
+          <p:cNvPr id="10" name="Content Placeholder 1"/>
+          <p:cNvSpPr>
+            <a:spLocks noGrp="1"/>
+          </p:cNvSpPr>
+          <p:nvPr>
+            <p:ph idx="1"/>
+          </p:nvPr>
+        </p:nvSpPr>
         <p:spPr>
           <a:xfrm>
-            <a:off x="457201" y="2514600"/>
-            <a:ext cx="5236756" cy="2686212"/>
-          </a:xfrm>
-          <a:prstGeom prst="rect">
-            <a:avLst/>
-          </a:prstGeom>
+            <a:off x="320040" y="1142999"/>
+            <a:ext cx="8503920" cy="4800600"/>
+          </a:xfrm>
         </p:spPr>
-      </p:pic>
-      <p:pic>
-        <p:nvPicPr>
-          <p:cNvPr id="6" name="Picture 5"/>
-          <p:cNvPicPr>
-            <a:picLocks noChangeAspect="1"/>
-          </p:cNvPicPr>
-          <p:nvPr/>
-        </p:nvPicPr>
-        <p:blipFill>
-          <a:blip r:embed="rId3">
-            <a:extLst>
-              <a:ext uri="{28A0092B-C50C-407E-A947-70E740481C1C}">
-                <a14:useLocalDpi xmlns:a14="http://schemas.microsoft.com/office/drawing/2010/main" val="0"/>
-              </a:ext>
-            </a:extLst>
-          </a:blip>
-          <a:stretch>
-            <a:fillRect/>
-          </a:stretch>
-        </p:blipFill>
-        <p:spPr>
-          <a:xfrm>
-            <a:off x="6248400" y="2514600"/>
-            <a:ext cx="2247900" cy="2247900"/>
-          </a:xfrm>
-          <a:prstGeom prst="rect">
-            <a:avLst/>
-          </a:prstGeom>
-        </p:spPr>
-      </p:pic>
+        <p:txBody>
+          <a:bodyPr/>
+          <a:lstStyle/>
+          <a:p>
+            <a:pPr marL="0" indent="0">
+              <a:buNone/>
+            </a:pPr>
+            <a:r>
+              <a:rPr lang="en-US" i="1" dirty="0"/>
+              <a:t>Direct connections to databases</a:t>
+            </a:r>
+          </a:p>
+          <a:p>
+            <a:pPr marL="0" indent="0">
+              <a:buNone/>
+            </a:pPr>
+            <a:endParaRPr lang="en-US" i="1" dirty="0"/>
+          </a:p>
+          <a:p>
+            <a:pPr>
+              <a:spcAft>
+                <a:spcPts val="0"/>
+              </a:spcAft>
+              <a:buFont typeface="Wingdings" panose="05000000000000000000" pitchFamily="2" charset="2"/>
+              <a:buChar char="§"/>
+            </a:pPr>
+            <a:r>
+              <a:rPr lang="en-US" i="1" dirty="0" smtClean="0"/>
+              <a:t>Project:</a:t>
+            </a:r>
+          </a:p>
+          <a:p>
+            <a:pPr marL="228600" lvl="1" indent="0">
+              <a:spcAft>
+                <a:spcPts val="0"/>
+              </a:spcAft>
+              <a:buNone/>
+            </a:pPr>
+            <a:endParaRPr lang="en-US" i="1" dirty="0" smtClean="0"/>
+          </a:p>
+          <a:p>
+            <a:pPr lvl="1">
+              <a:buFont typeface="Wingdings" panose="05000000000000000000" pitchFamily="2" charset="2"/>
+              <a:buChar char="§"/>
+            </a:pPr>
+            <a:r>
+              <a:rPr lang="en-US" dirty="0" smtClean="0"/>
+              <a:t>Tackling a problem we all have. Working with databases from Excel/VBA isn’t fun.</a:t>
+            </a:r>
+          </a:p>
+          <a:p>
+            <a:pPr lvl="1">
+              <a:buFont typeface="Wingdings" panose="05000000000000000000" pitchFamily="2" charset="2"/>
+              <a:buChar char="§"/>
+            </a:pPr>
+            <a:endParaRPr lang="en-US" dirty="0" smtClean="0"/>
+          </a:p>
+          <a:p>
+            <a:pPr lvl="1">
+              <a:buFont typeface="Wingdings" panose="05000000000000000000" pitchFamily="2" charset="2"/>
+              <a:buChar char="§"/>
+            </a:pPr>
+            <a:r>
+              <a:rPr lang="en-US" dirty="0" smtClean="0"/>
+              <a:t>Great support in R for connecting to </a:t>
+            </a:r>
+            <a:r>
+              <a:rPr lang="en-US" i="1" dirty="0" smtClean="0"/>
+              <a:t>any</a:t>
+            </a:r>
+            <a:r>
+              <a:rPr lang="en-US" dirty="0" smtClean="0"/>
+              <a:t> type of database</a:t>
+            </a:r>
+          </a:p>
+          <a:p>
+            <a:pPr lvl="1">
+              <a:buFont typeface="Wingdings" panose="05000000000000000000" pitchFamily="2" charset="2"/>
+              <a:buChar char="§"/>
+            </a:pPr>
+            <a:endParaRPr lang="en-US" dirty="0"/>
+          </a:p>
+          <a:p>
+            <a:pPr lvl="3">
+              <a:buFont typeface="Wingdings" panose="05000000000000000000" pitchFamily="2" charset="2"/>
+              <a:buChar char="§"/>
+            </a:pPr>
+            <a:r>
+              <a:rPr lang="en-US" dirty="0" smtClean="0"/>
+              <a:t>There just needs to be a “SQL translation” </a:t>
+            </a:r>
+          </a:p>
+          <a:p>
+            <a:pPr lvl="1">
+              <a:buFont typeface="Wingdings" panose="05000000000000000000" pitchFamily="2" charset="2"/>
+              <a:buChar char="§"/>
+            </a:pPr>
+            <a:endParaRPr lang="en-US" dirty="0"/>
+          </a:p>
+          <a:p>
+            <a:pPr lvl="3">
+              <a:buFont typeface="Wingdings" panose="05000000000000000000" pitchFamily="2" charset="2"/>
+              <a:buChar char="§"/>
+            </a:pPr>
+            <a:r>
+              <a:rPr lang="en-US" dirty="0" smtClean="0"/>
+              <a:t>Added that SQL translation for Access </a:t>
+            </a:r>
+          </a:p>
+          <a:p>
+            <a:pPr marL="685800" lvl="3" indent="0">
+              <a:buNone/>
+            </a:pPr>
+            <a:endParaRPr lang="en-US" dirty="0" smtClean="0"/>
+          </a:p>
+          <a:p>
+            <a:pPr lvl="1">
+              <a:buFont typeface="Wingdings" panose="05000000000000000000" pitchFamily="2" charset="2"/>
+              <a:buChar char="§"/>
+            </a:pPr>
+            <a:r>
+              <a:rPr lang="en-US" dirty="0" smtClean="0">
+                <a:hlinkClick r:id="rId2"/>
+              </a:rPr>
+              <a:t>Let’s have some fun</a:t>
+            </a:r>
+            <a:endParaRPr lang="en-US" dirty="0"/>
+          </a:p>
+          <a:p>
+            <a:pPr marL="685800" lvl="3" indent="0">
+              <a:buNone/>
+            </a:pPr>
+            <a:endParaRPr lang="en-US" dirty="0" smtClean="0"/>
+          </a:p>
+        </p:txBody>
+      </p:sp>
     </p:spTree>
     <p:extLst>
       <p:ext uri="{BB962C8B-B14F-4D97-AF65-F5344CB8AC3E}">
-        <p14:creationId xmlns:p14="http://schemas.microsoft.com/office/powerpoint/2010/main" val="224078259"/>
+        <p14:creationId xmlns:p14="http://schemas.microsoft.com/office/powerpoint/2010/main" val="3364505904"/>
       </p:ext>
     </p:extLst>
   </p:cSld>
@@ -11090,7 +11112,9 @@
         </p:nvSpPr>
         <p:spPr/>
         <p:txBody>
-          <a:bodyPr/>
+          <a:bodyPr>
+            <a:normAutofit fontScale="92500" lnSpcReduction="10000"/>
+          </a:bodyPr>
           <a:lstStyle/>
           <a:p>
             <a:pPr>
@@ -11110,6 +11134,33 @@
             <a:r>
               <a:rPr lang="en-US" dirty="0" smtClean="0"/>
               <a:t>Mathematical Finance</a:t>
+            </a:r>
+          </a:p>
+          <a:p>
+            <a:pPr marL="347472" lvl="1" indent="0">
+              <a:buNone/>
+            </a:pPr>
+            <a:endParaRPr lang="en-US" dirty="0" smtClean="0"/>
+          </a:p>
+          <a:p>
+            <a:pPr>
+              <a:buFont typeface="Wingdings" panose="05000000000000000000" pitchFamily="2" charset="2"/>
+              <a:buChar char="§"/>
+            </a:pPr>
+            <a:r>
+              <a:rPr lang="en-US" dirty="0" smtClean="0"/>
+              <a:t>Exams</a:t>
+            </a:r>
+            <a:endParaRPr lang="en-US" dirty="0"/>
+          </a:p>
+          <a:p>
+            <a:pPr lvl="1">
+              <a:buFont typeface="Wingdings" panose="05000000000000000000" pitchFamily="2" charset="2"/>
+              <a:buChar char="§"/>
+            </a:pPr>
+            <a:r>
+              <a:rPr lang="en-US" dirty="0" smtClean="0"/>
+              <a:t>P &amp; FM</a:t>
             </a:r>
           </a:p>
           <a:p>
@@ -11277,7 +11328,7 @@
               <a:buNone/>
             </a:pPr>
             <a:r>
-              <a:rPr lang="en-US" i="1" dirty="0"/>
+              <a:rPr lang="en-US" i="1" dirty="0" smtClean="0"/>
               <a:t>Direct connections to databases</a:t>
             </a:r>
           </a:p>
@@ -11323,6 +11374,195 @@
             <a:fld id="{E49B4C36-CA85-496D-A067-FC602A1FD8AC}" type="slidenum">
               <a:rPr lang="en-US" smtClean="0"/>
               <a:t>20</a:t>
+            </a:fld>
+            <a:endParaRPr lang="en-US"/>
+          </a:p>
+        </p:txBody>
+      </p:sp>
+      <p:sp>
+        <p:nvSpPr>
+          <p:cNvPr id="4" name="Title 3"/>
+          <p:cNvSpPr>
+            <a:spLocks noGrp="1"/>
+          </p:cNvSpPr>
+          <p:nvPr>
+            <p:ph type="title"/>
+          </p:nvPr>
+        </p:nvSpPr>
+        <p:spPr/>
+        <p:txBody>
+          <a:bodyPr/>
+          <a:lstStyle/>
+          <a:p>
+            <a:r>
+              <a:rPr lang="en-US" dirty="0"/>
+              <a:t>speed</a:t>
+            </a:r>
+          </a:p>
+        </p:txBody>
+      </p:sp>
+      <p:pic>
+        <p:nvPicPr>
+          <p:cNvPr id="5" name="Picture 4"/>
+          <p:cNvPicPr>
+            <a:picLocks noChangeAspect="1"/>
+          </p:cNvPicPr>
+          <p:nvPr/>
+        </p:nvPicPr>
+        <p:blipFill>
+          <a:blip r:embed="rId2">
+            <a:extLst>
+              <a:ext uri="{28A0092B-C50C-407E-A947-70E740481C1C}">
+                <a14:useLocalDpi xmlns:a14="http://schemas.microsoft.com/office/drawing/2010/main" val="0"/>
+              </a:ext>
+            </a:extLst>
+          </a:blip>
+          <a:stretch>
+            <a:fillRect/>
+          </a:stretch>
+        </p:blipFill>
+        <p:spPr>
+          <a:xfrm>
+            <a:off x="457201" y="2514600"/>
+            <a:ext cx="5236756" cy="2686212"/>
+          </a:xfrm>
+          <a:prstGeom prst="rect">
+            <a:avLst/>
+          </a:prstGeom>
+        </p:spPr>
+      </p:pic>
+      <p:pic>
+        <p:nvPicPr>
+          <p:cNvPr id="6" name="Picture 5"/>
+          <p:cNvPicPr>
+            <a:picLocks noChangeAspect="1"/>
+          </p:cNvPicPr>
+          <p:nvPr/>
+        </p:nvPicPr>
+        <p:blipFill>
+          <a:blip r:embed="rId3">
+            <a:extLst>
+              <a:ext uri="{28A0092B-C50C-407E-A947-70E740481C1C}">
+                <a14:useLocalDpi xmlns:a14="http://schemas.microsoft.com/office/drawing/2010/main" val="0"/>
+              </a:ext>
+            </a:extLst>
+          </a:blip>
+          <a:stretch>
+            <a:fillRect/>
+          </a:stretch>
+        </p:blipFill>
+        <p:spPr>
+          <a:xfrm>
+            <a:off x="6248400" y="2514600"/>
+            <a:ext cx="2247900" cy="2247900"/>
+          </a:xfrm>
+          <a:prstGeom prst="rect">
+            <a:avLst/>
+          </a:prstGeom>
+        </p:spPr>
+      </p:pic>
+    </p:spTree>
+    <p:extLst>
+      <p:ext uri="{BB962C8B-B14F-4D97-AF65-F5344CB8AC3E}">
+        <p14:creationId xmlns:p14="http://schemas.microsoft.com/office/powerpoint/2010/main" val="224078259"/>
+      </p:ext>
+    </p:extLst>
+  </p:cSld>
+  <p:clrMapOvr>
+    <a:masterClrMapping/>
+  </p:clrMapOvr>
+  <p:timing>
+    <p:tnLst>
+      <p:par>
+        <p:cTn id="1" dur="indefinite" restart="never" nodeType="tmRoot"/>
+      </p:par>
+    </p:tnLst>
+  </p:timing>
+</p:sld>
+</file>
+
+<file path=ppt/slides/slide21.xml><?xml version="1.0" encoding="utf-8"?>
+<p:sld xmlns:a="http://schemas.openxmlformats.org/drawingml/2006/main" xmlns:r="http://schemas.openxmlformats.org/officeDocument/2006/relationships" xmlns:p="http://schemas.openxmlformats.org/presentationml/2006/main">
+  <p:cSld>
+    <p:spTree>
+      <p:nvGrpSpPr>
+        <p:cNvPr id="1" name=""/>
+        <p:cNvGrpSpPr/>
+        <p:nvPr/>
+      </p:nvGrpSpPr>
+      <p:grpSpPr>
+        <a:xfrm>
+          <a:off x="0" y="0"/>
+          <a:ext cx="0" cy="0"/>
+          <a:chOff x="0" y="0"/>
+          <a:chExt cx="0" cy="0"/>
+        </a:xfrm>
+      </p:grpSpPr>
+      <p:sp>
+        <p:nvSpPr>
+          <p:cNvPr id="2" name="Content Placeholder 1"/>
+          <p:cNvSpPr>
+            <a:spLocks noGrp="1"/>
+          </p:cNvSpPr>
+          <p:nvPr>
+            <p:ph idx="1"/>
+          </p:nvPr>
+        </p:nvSpPr>
+        <p:spPr/>
+        <p:txBody>
+          <a:bodyPr/>
+          <a:lstStyle/>
+          <a:p>
+            <a:pPr marL="0" indent="0">
+              <a:buNone/>
+            </a:pPr>
+            <a:r>
+              <a:rPr lang="en-US" i="1" dirty="0"/>
+              <a:t>Direct connections to databases</a:t>
+            </a:r>
+          </a:p>
+          <a:p>
+            <a:pPr marL="0" indent="0">
+              <a:buNone/>
+            </a:pPr>
+            <a:endParaRPr lang="en-US" i="1" dirty="0"/>
+          </a:p>
+          <a:p>
+            <a:pPr>
+              <a:buFont typeface="Wingdings" panose="05000000000000000000" pitchFamily="2" charset="2"/>
+              <a:buChar char="§"/>
+            </a:pPr>
+            <a:r>
+              <a:rPr lang="en-US" i="1" dirty="0" smtClean="0"/>
+              <a:t>Benefits:</a:t>
+            </a:r>
+          </a:p>
+          <a:p>
+            <a:pPr marL="228600" lvl="1" indent="0">
+              <a:buNone/>
+            </a:pPr>
+            <a:endParaRPr lang="en-US" i="1" dirty="0"/>
+          </a:p>
+        </p:txBody>
+      </p:sp>
+      <p:sp>
+        <p:nvSpPr>
+          <p:cNvPr id="3" name="Slide Number Placeholder 2"/>
+          <p:cNvSpPr>
+            <a:spLocks noGrp="1"/>
+          </p:cNvSpPr>
+          <p:nvPr>
+            <p:ph type="sldNum" sz="quarter" idx="12"/>
+          </p:nvPr>
+        </p:nvSpPr>
+        <p:spPr/>
+        <p:txBody>
+          <a:bodyPr/>
+          <a:lstStyle/>
+          <a:p>
+            <a:fld id="{E49B4C36-CA85-496D-A067-FC602A1FD8AC}" type="slidenum">
+              <a:rPr lang="en-US" smtClean="0"/>
+              <a:t>21</a:t>
             </a:fld>
             <a:endParaRPr lang="en-US"/>
           </a:p>
@@ -11532,7 +11772,7 @@
 </p:sld>
 </file>
 
-<file path=ppt/slides/slide21.xml><?xml version="1.0" encoding="utf-8"?>
+<file path=ppt/slides/slide22.xml><?xml version="1.0" encoding="utf-8"?>
 <p:sld xmlns:a="http://schemas.openxmlformats.org/drawingml/2006/main" xmlns:r="http://schemas.openxmlformats.org/officeDocument/2006/relationships" xmlns:p="http://schemas.openxmlformats.org/presentationml/2006/main">
   <p:cSld>
     <p:spTree>
@@ -11699,7 +11939,7 @@
           <a:p>
             <a:fld id="{E49B4C36-CA85-496D-A067-FC602A1FD8AC}" type="slidenum">
               <a:rPr lang="en-US" smtClean="0"/>
-              <a:t>21</a:t>
+              <a:t>22</a:t>
             </a:fld>
             <a:endParaRPr lang="en-US"/>
           </a:p>
@@ -11778,7 +12018,7 @@
 </p:sld>
 </file>
 
-<file path=ppt/slides/slide22.xml><?xml version="1.0" encoding="utf-8"?>
+<file path=ppt/slides/slide23.xml><?xml version="1.0" encoding="utf-8"?>
 <p:sld xmlns:a="http://schemas.openxmlformats.org/drawingml/2006/main" xmlns:r="http://schemas.openxmlformats.org/officeDocument/2006/relationships" xmlns:p="http://schemas.openxmlformats.org/presentationml/2006/main">
   <p:cSld>
     <p:spTree>

</xml_diff>

<commit_message>
a few slide changes and hide book value
</commit_message>
<xml_diff>
--- a/final-presentation/final-presentation-davis-vaughan.pptx
+++ b/final-presentation/final-presentation-davis-vaughan.pptx
@@ -11185,7 +11185,6 @@
               <a:rPr lang="en-US" i="1" dirty="0" smtClean="0"/>
               <a:t>Resources</a:t>
             </a:r>
-            <a:endParaRPr lang="en-US" i="1" dirty="0" smtClean="0"/>
           </a:p>
           <a:p>
             <a:pPr marL="0" indent="0">
@@ -11420,7 +11419,15 @@
             </a:pPr>
             <a:r>
               <a:rPr lang="en-US" dirty="0" smtClean="0"/>
-              <a:t>Analyzing portfolio book value and yield data</a:t>
+              <a:t>Visualizing </a:t>
+            </a:r>
+            <a:r>
+              <a:rPr lang="en-US" dirty="0" smtClean="0"/>
+              <a:t>cash </a:t>
+            </a:r>
+            <a:r>
+              <a:rPr lang="en-US" dirty="0" smtClean="0"/>
+              <a:t>flows</a:t>
             </a:r>
           </a:p>
           <a:p>
@@ -11429,17 +11436,14 @@
               <a:buChar char="§"/>
             </a:pPr>
             <a:r>
-              <a:rPr lang="en-US" dirty="0" smtClean="0"/>
-              <a:t>Visualizing cash </a:t>
-            </a:r>
-            <a:r>
               <a:rPr lang="en-US" dirty="0"/>
-              <a:t>f</a:t>
-            </a:r>
-            <a:r>
-              <a:rPr lang="en-US" dirty="0" smtClean="0"/>
-              <a:t>lows</a:t>
-            </a:r>
+              <a:t>Analyzing portfolio book value and yield </a:t>
+            </a:r>
+            <a:r>
+              <a:rPr lang="en-US" dirty="0" smtClean="0"/>
+              <a:t>data</a:t>
+            </a:r>
+            <a:endParaRPr lang="en-US" dirty="0" smtClean="0"/>
           </a:p>
           <a:p>
             <a:pPr marL="228600" lvl="1" indent="0">
@@ -11943,8 +11947,16 @@
               <a:buNone/>
             </a:pPr>
             <a:r>
+              <a:rPr lang="en-US" i="1" dirty="0"/>
+              <a:t>Interactive </a:t>
+            </a:r>
+            <a:r>
               <a:rPr lang="en-US" i="1" dirty="0" smtClean="0"/>
-              <a:t>Visualizing cash flows</a:t>
+              <a:t>dashboards using </a:t>
+            </a:r>
+            <a:r>
+              <a:rPr lang="en-US" i="1" dirty="0"/>
+              <a:t>R and Shiny</a:t>
             </a:r>
           </a:p>
           <a:p>
@@ -11986,15 +11998,11 @@
             </a:pPr>
             <a:r>
               <a:rPr lang="en-US" dirty="0" smtClean="0"/>
-              <a:t>Visualize </a:t>
-            </a:r>
-            <a:r>
-              <a:rPr lang="en-US" dirty="0" smtClean="0"/>
-              <a:t>ALFA cash </a:t>
-            </a:r>
-            <a:r>
-              <a:rPr lang="en-US" dirty="0" smtClean="0"/>
-              <a:t>flow projection data (a lot of it)</a:t>
+              <a:t>Visualize ALFA cash flow projection </a:t>
+            </a:r>
+            <a:r>
+              <a:rPr lang="en-US" dirty="0" smtClean="0"/>
+              <a:t>data</a:t>
             </a:r>
           </a:p>
           <a:p>
@@ -12331,8 +12339,8 @@
               <a:buNone/>
             </a:pPr>
             <a:r>
-              <a:rPr lang="en-US" i="1" dirty="0" smtClean="0"/>
-              <a:t>Visualizing cash flows</a:t>
+              <a:rPr lang="en-US" i="1" dirty="0"/>
+              <a:t>Interactive dashboards using R and Shiny</a:t>
             </a:r>
           </a:p>
           <a:p>
@@ -12353,7 +12361,6 @@
               <a:rPr lang="en-US" i="1" dirty="0" smtClean="0"/>
               <a:t>Solution:</a:t>
             </a:r>
-            <a:endParaRPr lang="en-US" i="1" dirty="0" smtClean="0"/>
           </a:p>
           <a:p>
             <a:pPr lvl="2">
@@ -12506,7 +12513,7 @@
 </file>
 
 <file path=ppt/slides/slide6.xml><?xml version="1.0" encoding="utf-8"?>
-<p:sld xmlns:a="http://schemas.openxmlformats.org/drawingml/2006/main" xmlns:r="http://schemas.openxmlformats.org/officeDocument/2006/relationships" xmlns:p="http://schemas.openxmlformats.org/presentationml/2006/main">
+<p:sld xmlns:a="http://schemas.openxmlformats.org/drawingml/2006/main" xmlns:r="http://schemas.openxmlformats.org/officeDocument/2006/relationships" xmlns:p="http://schemas.openxmlformats.org/presentationml/2006/main" show="0">
   <p:cSld>
     <p:spTree>
       <p:nvGrpSpPr>
@@ -12542,8 +12549,9 @@
             </a:pPr>
             <a:r>
               <a:rPr lang="en-US" i="1" dirty="0" smtClean="0"/>
-              <a:t>Interactive reporting using R and Shiny</a:t>
-            </a:r>
+              <a:t>Visualizing book value and yield changes</a:t>
+            </a:r>
+            <a:endParaRPr lang="en-US" i="1" dirty="0" smtClean="0"/>
           </a:p>
           <a:p>
             <a:pPr marL="0" indent="0">
@@ -12691,6 +12699,14 @@
   <p:clrMapOvr>
     <a:masterClrMapping/>
   </p:clrMapOvr>
+  <mc:AlternateContent xmlns:mc="http://schemas.openxmlformats.org/markup-compatibility/2006">
+    <mc:Choice xmlns:p14="http://schemas.microsoft.com/office/powerpoint/2010/main" Requires="p14">
+      <p:transition spd="slow" p14:dur="2000"/>
+    </mc:Choice>
+    <mc:Fallback>
+      <p:transition spd="slow"/>
+    </mc:Fallback>
+  </mc:AlternateContent>
   <p:timing>
     <p:tnLst>
       <p:par>
@@ -12702,7 +12718,7 @@
 </file>
 
 <file path=ppt/slides/slide7.xml><?xml version="1.0" encoding="utf-8"?>
-<p:sld xmlns:a="http://schemas.openxmlformats.org/drawingml/2006/main" xmlns:r="http://schemas.openxmlformats.org/officeDocument/2006/relationships" xmlns:p="http://schemas.openxmlformats.org/presentationml/2006/main">
+<p:sld xmlns:a="http://schemas.openxmlformats.org/drawingml/2006/main" xmlns:r="http://schemas.openxmlformats.org/officeDocument/2006/relationships" xmlns:p="http://schemas.openxmlformats.org/presentationml/2006/main" show="0">
   <p:cSld>
     <p:spTree>
       <p:nvGrpSpPr>
@@ -12737,8 +12753,8 @@
               <a:buNone/>
             </a:pPr>
             <a:r>
-              <a:rPr lang="en-US" i="1" dirty="0" smtClean="0"/>
-              <a:t>Interactive reporting using R and Shiny</a:t>
+              <a:rPr lang="en-US" i="1" dirty="0"/>
+              <a:t>Visualizing book value and yield changes</a:t>
             </a:r>
           </a:p>
           <a:p>
@@ -12868,6 +12884,14 @@
   <p:clrMapOvr>
     <a:masterClrMapping/>
   </p:clrMapOvr>
+  <mc:AlternateContent xmlns:mc="http://schemas.openxmlformats.org/markup-compatibility/2006">
+    <mc:Choice xmlns:p14="http://schemas.microsoft.com/office/powerpoint/2010/main" Requires="p14">
+      <p:transition spd="slow" p14:dur="2000"/>
+    </mc:Choice>
+    <mc:Fallback>
+      <p:transition spd="slow"/>
+    </mc:Fallback>
+  </mc:AlternateContent>
   <p:timing>
     <p:tnLst>
       <p:par>
@@ -12879,7 +12903,7 @@
 </file>
 
 <file path=ppt/slides/slide8.xml><?xml version="1.0" encoding="utf-8"?>
-<p:sld xmlns:a="http://schemas.openxmlformats.org/drawingml/2006/main" xmlns:r="http://schemas.openxmlformats.org/officeDocument/2006/relationships" xmlns:p="http://schemas.openxmlformats.org/presentationml/2006/main">
+<p:sld xmlns:a="http://schemas.openxmlformats.org/drawingml/2006/main" xmlns:r="http://schemas.openxmlformats.org/officeDocument/2006/relationships" xmlns:p="http://schemas.openxmlformats.org/presentationml/2006/main" show="0">
   <p:cSld>
     <p:spTree>
       <p:nvGrpSpPr>
@@ -12914,8 +12938,8 @@
               <a:buNone/>
             </a:pPr>
             <a:r>
-              <a:rPr lang="en-US" i="1" dirty="0" smtClean="0"/>
-              <a:t>Interactive reporting using R and Shiny</a:t>
+              <a:rPr lang="en-US" i="1" dirty="0"/>
+              <a:t>Visualizing book value and yield changes</a:t>
             </a:r>
           </a:p>
           <a:p>
@@ -13103,6 +13127,14 @@
   <p:clrMapOvr>
     <a:masterClrMapping/>
   </p:clrMapOvr>
+  <mc:AlternateContent xmlns:mc="http://schemas.openxmlformats.org/markup-compatibility/2006">
+    <mc:Choice xmlns:p14="http://schemas.microsoft.com/office/powerpoint/2010/main" Requires="p14">
+      <p:transition spd="slow" p14:dur="2000"/>
+    </mc:Choice>
+    <mc:Fallback>
+      <p:transition spd="slow"/>
+    </mc:Fallback>
+  </mc:AlternateContent>
   <p:timing>
     <p:tnLst>
       <p:par>

</xml_diff>